<commit_message>
Added Final Presentation template
</commit_message>
<xml_diff>
--- a/A Team Documents/Final presentation.pptx
+++ b/A Team Documents/Final presentation.pptx
@@ -5,10 +5,10 @@
     <p:sldMasterId id="2147483732" r:id="rId1"/>
   </p:sldMasterIdLst>
   <p:notesMasterIdLst>
-    <p:notesMasterId r:id="rId22"/>
+    <p:notesMasterId r:id="rId17"/>
   </p:notesMasterIdLst>
   <p:handoutMasterIdLst>
-    <p:handoutMasterId r:id="rId23"/>
+    <p:handoutMasterId r:id="rId18"/>
   </p:handoutMasterIdLst>
   <p:sldIdLst>
     <p:sldId id="288" r:id="rId2"/>
@@ -16,21 +16,16 @@
     <p:sldId id="296" r:id="rId4"/>
     <p:sldId id="297" r:id="rId5"/>
     <p:sldId id="299" r:id="rId6"/>
-    <p:sldId id="298" r:id="rId7"/>
-    <p:sldId id="300" r:id="rId8"/>
-    <p:sldId id="301" r:id="rId9"/>
-    <p:sldId id="302" r:id="rId10"/>
-    <p:sldId id="303" r:id="rId11"/>
-    <p:sldId id="310" r:id="rId12"/>
-    <p:sldId id="311" r:id="rId13"/>
-    <p:sldId id="312" r:id="rId14"/>
-    <p:sldId id="304" r:id="rId15"/>
-    <p:sldId id="306" r:id="rId16"/>
-    <p:sldId id="305" r:id="rId17"/>
-    <p:sldId id="307" r:id="rId18"/>
-    <p:sldId id="308" r:id="rId19"/>
-    <p:sldId id="295" r:id="rId20"/>
-    <p:sldId id="313" r:id="rId21"/>
+    <p:sldId id="313" r:id="rId7"/>
+    <p:sldId id="314" r:id="rId8"/>
+    <p:sldId id="298" r:id="rId9"/>
+    <p:sldId id="300" r:id="rId10"/>
+    <p:sldId id="315" r:id="rId11"/>
+    <p:sldId id="316" r:id="rId12"/>
+    <p:sldId id="317" r:id="rId13"/>
+    <p:sldId id="318" r:id="rId14"/>
+    <p:sldId id="308" r:id="rId15"/>
+    <p:sldId id="295" r:id="rId16"/>
   </p:sldIdLst>
   <p:sldSz cx="9144000" cy="6858000" type="screen4x3"/>
   <p:notesSz cx="6858000" cy="9144000"/>
@@ -215,7 +210,7 @@
             <a:fld id="{59E2BC62-7E84-44FB-9A81-3B8AD9AE521B}" type="datetimeFigureOut">
               <a:rPr lang="en-US" smtClean="0"/>
               <a:pPr/>
-              <a:t>4/27/2015</a:t>
+              <a:t>5/3/2015</a:t>
             </a:fld>
             <a:endParaRPr lang="en-US"/>
           </a:p>
@@ -382,7 +377,7 @@
             <a:fld id="{AC4D07E4-89AF-44D2-9F2F-5F6D2623599A}" type="datetimeFigureOut">
               <a:rPr lang="en-US" smtClean="0"/>
               <a:pPr/>
-              <a:t>4/27/2015</a:t>
+              <a:t>5/3/2015</a:t>
             </a:fld>
             <a:endParaRPr lang="en-US"/>
           </a:p>
@@ -1218,7 +1213,7 @@
             <a:fld id="{461E6A8B-52D2-4FB9-BB2D-A053F589DABE}" type="datetimeFigureOut">
               <a:rPr lang="en-US" smtClean="0"/>
               <a:pPr/>
-              <a:t>4/27/2015</a:t>
+              <a:t>5/3/2015</a:t>
             </a:fld>
             <a:endParaRPr lang="en-US" dirty="0"/>
           </a:p>
@@ -1385,7 +1380,7 @@
             <a:fld id="{461E6A8B-52D2-4FB9-BB2D-A053F589DABE}" type="datetimeFigureOut">
               <a:rPr lang="en-US" smtClean="0"/>
               <a:pPr/>
-              <a:t>4/27/2015</a:t>
+              <a:t>5/3/2015</a:t>
             </a:fld>
             <a:endParaRPr lang="en-US"/>
           </a:p>
@@ -1562,7 +1557,7 @@
             <a:fld id="{461E6A8B-52D2-4FB9-BB2D-A053F589DABE}" type="datetimeFigureOut">
               <a:rPr lang="en-US" smtClean="0"/>
               <a:pPr/>
-              <a:t>4/27/2015</a:t>
+              <a:t>5/3/2015</a:t>
             </a:fld>
             <a:endParaRPr lang="en-US"/>
           </a:p>
@@ -1729,7 +1724,7 @@
             <a:fld id="{461E6A8B-52D2-4FB9-BB2D-A053F589DABE}" type="datetimeFigureOut">
               <a:rPr lang="en-US" smtClean="0"/>
               <a:pPr/>
-              <a:t>4/27/2015</a:t>
+              <a:t>5/3/2015</a:t>
             </a:fld>
             <a:endParaRPr lang="en-US"/>
           </a:p>
@@ -1972,7 +1967,7 @@
             <a:fld id="{461E6A8B-52D2-4FB9-BB2D-A053F589DABE}" type="datetimeFigureOut">
               <a:rPr lang="en-US" smtClean="0"/>
               <a:pPr/>
-              <a:t>4/27/2015</a:t>
+              <a:t>5/3/2015</a:t>
             </a:fld>
             <a:endParaRPr lang="en-US"/>
           </a:p>
@@ -2257,7 +2252,7 @@
             <a:fld id="{461E6A8B-52D2-4FB9-BB2D-A053F589DABE}" type="datetimeFigureOut">
               <a:rPr lang="en-US" smtClean="0"/>
               <a:pPr/>
-              <a:t>4/27/2015</a:t>
+              <a:t>5/3/2015</a:t>
             </a:fld>
             <a:endParaRPr lang="en-US"/>
           </a:p>
@@ -2676,7 +2671,7 @@
             <a:fld id="{461E6A8B-52D2-4FB9-BB2D-A053F589DABE}" type="datetimeFigureOut">
               <a:rPr lang="en-US" smtClean="0"/>
               <a:pPr/>
-              <a:t>4/27/2015</a:t>
+              <a:t>5/3/2015</a:t>
             </a:fld>
             <a:endParaRPr lang="en-US"/>
           </a:p>
@@ -2791,7 +2786,7 @@
             <a:fld id="{461E6A8B-52D2-4FB9-BB2D-A053F589DABE}" type="datetimeFigureOut">
               <a:rPr lang="en-US" smtClean="0"/>
               <a:pPr/>
-              <a:t>4/27/2015</a:t>
+              <a:t>5/3/2015</a:t>
             </a:fld>
             <a:endParaRPr lang="en-US"/>
           </a:p>
@@ -2883,7 +2878,7 @@
             <a:fld id="{461E6A8B-52D2-4FB9-BB2D-A053F589DABE}" type="datetimeFigureOut">
               <a:rPr lang="en-US" smtClean="0"/>
               <a:pPr/>
-              <a:t>4/27/2015</a:t>
+              <a:t>5/3/2015</a:t>
             </a:fld>
             <a:endParaRPr lang="en-US"/>
           </a:p>
@@ -3157,7 +3152,7 @@
             <a:fld id="{461E6A8B-52D2-4FB9-BB2D-A053F589DABE}" type="datetimeFigureOut">
               <a:rPr lang="en-US" smtClean="0"/>
               <a:pPr/>
-              <a:t>4/27/2015</a:t>
+              <a:t>5/3/2015</a:t>
             </a:fld>
             <a:endParaRPr lang="en-US"/>
           </a:p>
@@ -3407,7 +3402,7 @@
             <a:fld id="{461E6A8B-52D2-4FB9-BB2D-A053F589DABE}" type="datetimeFigureOut">
               <a:rPr lang="en-US" smtClean="0"/>
               <a:pPr/>
-              <a:t>4/27/2015</a:t>
+              <a:t>5/3/2015</a:t>
             </a:fld>
             <a:endParaRPr lang="en-US"/>
           </a:p>
@@ -3635,7 +3630,7 @@
             <a:fld id="{461E6A8B-52D2-4FB9-BB2D-A053F589DABE}" type="datetimeFigureOut">
               <a:rPr lang="en-US" smtClean="0"/>
               <a:pPr/>
-              <a:t>4/27/2015</a:t>
+              <a:t>5/3/2015</a:t>
             </a:fld>
             <a:endParaRPr lang="en-US"/>
           </a:p>
@@ -4159,29 +4154,7 @@
                   </a:schemeClr>
                 </a:solidFill>
               </a:rPr>
-              <a:t>March </a:t>
-            </a:r>
-            <a:r>
-              <a:rPr lang="en-US" sz="2800" b="1" dirty="0" smtClean="0">
-                <a:solidFill>
-                  <a:schemeClr val="tx1">
-                    <a:lumMod val="65000"/>
-                    <a:lumOff val="35000"/>
-                  </a:schemeClr>
-                </a:solidFill>
-              </a:rPr>
-              <a:t>4</a:t>
-            </a:r>
-            <a:r>
-              <a:rPr lang="en-US" sz="2800" b="1" dirty="0" smtClean="0">
-                <a:solidFill>
-                  <a:schemeClr val="tx1">
-                    <a:lumMod val="65000"/>
-                    <a:lumOff val="35000"/>
-                  </a:schemeClr>
-                </a:solidFill>
-              </a:rPr>
-              <a:t>, </a:t>
+              <a:t>May 4, </a:t>
             </a:r>
             <a:r>
               <a:rPr lang="en-US" sz="2800" b="1" dirty="0" smtClean="0">
@@ -4340,7 +4313,11 @@
           <a:p>
             <a:r>
               <a:rPr lang="en-US" dirty="0" smtClean="0"/>
-              <a:t>Team Organization</a:t>
+              <a:t>Hypothetical – </a:t>
+            </a:r>
+            <a:r>
+              <a:rPr lang="en-US" dirty="0" err="1" smtClean="0"/>
+              <a:t>Sanan</a:t>
             </a:r>
             <a:endParaRPr lang="en-US" dirty="0"/>
           </a:p>
@@ -4358,52 +4335,30 @@
         </p:nvSpPr>
         <p:spPr/>
         <p:txBody>
-          <a:bodyPr>
-            <a:normAutofit lnSpcReduction="10000"/>
-          </a:bodyPr>
+          <a:bodyPr/>
           <a:lstStyle/>
           <a:p>
             <a:r>
               <a:rPr lang="en-US" dirty="0" smtClean="0"/>
-              <a:t>James Rowe as Team Leader</a:t>
-            </a:r>
+              <a:t>What if we had more time?</a:t>
+            </a:r>
+          </a:p>
+          <a:p>
+            <a:endParaRPr lang="en-US" dirty="0" smtClean="0"/>
           </a:p>
           <a:p>
             <a:r>
               <a:rPr lang="en-US" dirty="0" smtClean="0"/>
-              <a:t>Controlled, Decentralized</a:t>
-            </a:r>
+              <a:t>What if we could start over?</a:t>
+            </a:r>
+          </a:p>
+          <a:p>
+            <a:endParaRPr lang="en-US" dirty="0" smtClean="0"/>
           </a:p>
           <a:p>
             <a:r>
               <a:rPr lang="en-US" dirty="0" smtClean="0"/>
-              <a:t>All members contribute to documentation via primary authoring or editing</a:t>
-            </a:r>
-          </a:p>
-          <a:p>
-            <a:r>
-              <a:rPr lang="en-US" dirty="0" smtClean="0"/>
-              <a:t>Coding split based on functionality, </a:t>
-            </a:r>
-          </a:p>
-          <a:p>
-            <a:pPr lvl="1"/>
-            <a:r>
-              <a:rPr lang="en-US" dirty="0" smtClean="0"/>
-              <a:t>Two pairs of partners focusing on a set of features</a:t>
-            </a:r>
-          </a:p>
-          <a:p>
-            <a:pPr lvl="1"/>
-            <a:r>
-              <a:rPr lang="en-US" dirty="0" smtClean="0"/>
-              <a:t>James/Romando Garcia and Anne Lam/Sanan Aamir</a:t>
-            </a:r>
-          </a:p>
-          <a:p>
-            <a:r>
-              <a:rPr lang="en-US" dirty="0" smtClean="0"/>
-              <a:t>Hieu Tran - testing and documentation</a:t>
+              <a:t>What we learned</a:t>
             </a:r>
             <a:endParaRPr lang="en-US" dirty="0"/>
           </a:p>
@@ -4414,13 +4369,6 @@
   <p:clrMapOvr>
     <a:masterClrMapping/>
   </p:clrMapOvr>
-  <p:timing>
-    <p:tnLst>
-      <p:par>
-        <p:cTn id="1" dur="indefinite" restart="never" nodeType="tmRoot"/>
-      </p:par>
-    </p:tnLst>
-  </p:timing>
 </p:sld>
 </file>
 
@@ -4458,7 +4406,7 @@
           <a:p>
             <a:r>
               <a:rPr lang="en-US" dirty="0" smtClean="0"/>
-              <a:t>Additional Plan Details</a:t>
+              <a:t>Hypothetical – Anne</a:t>
             </a:r>
             <a:endParaRPr lang="en-US" dirty="0"/>
           </a:p>
@@ -4471,107 +4419,37 @@
             <a:spLocks noGrp="1"/>
           </p:cNvSpPr>
           <p:nvPr>
-            <p:ph sz="half" idx="1"/>
-          </p:nvPr>
-        </p:nvSpPr>
-        <p:spPr>
-          <a:xfrm>
-            <a:off x="457200" y="1600200"/>
-            <a:ext cx="3352800" cy="4525963"/>
-          </a:xfrm>
-        </p:spPr>
+            <p:ph idx="1"/>
+          </p:nvPr>
+        </p:nvSpPr>
+        <p:spPr/>
         <p:txBody>
           <a:bodyPr/>
           <a:lstStyle/>
           <a:p>
             <a:r>
               <a:rPr lang="en-US" dirty="0" smtClean="0"/>
-              <a:t>Visual Studio &amp; C#</a:t>
-            </a:r>
-          </a:p>
-          <a:p>
-            <a:r>
-              <a:rPr lang="en-US" dirty="0" err="1" smtClean="0"/>
-              <a:t>Github</a:t>
-            </a:r>
+              <a:t>What if we had more time?</a:t>
+            </a:r>
+          </a:p>
+          <a:p>
+            <a:endParaRPr lang="en-US" dirty="0" smtClean="0"/>
+          </a:p>
+          <a:p>
             <a:r>
               <a:rPr lang="en-US" dirty="0" smtClean="0"/>
-              <a:t> for Version Control and Project Storage</a:t>
-            </a:r>
+              <a:t>What if we could start over?</a:t>
+            </a:r>
+          </a:p>
+          <a:p>
+            <a:endParaRPr lang="en-US" dirty="0" smtClean="0"/>
           </a:p>
           <a:p>
             <a:r>
               <a:rPr lang="en-US" dirty="0" smtClean="0"/>
-              <a:t>Communicate often, formal meetings weekly</a:t>
+              <a:t>What we learned</a:t>
             </a:r>
             <a:endParaRPr lang="en-US" dirty="0"/>
-          </a:p>
-        </p:txBody>
-      </p:sp>
-      <p:pic>
-        <p:nvPicPr>
-          <p:cNvPr id="5" name="Content Placeholder 4" descr="Macintosh HD:Users:watdahieu:Dropbox:Gant.png"/>
-          <p:cNvPicPr>
-            <a:picLocks noGrp="1"/>
-          </p:cNvPicPr>
-          <p:nvPr>
-            <p:ph sz="half" idx="2"/>
-          </p:nvPr>
-        </p:nvPicPr>
-        <p:blipFill>
-          <a:blip r:embed="rId2" cstate="print">
-            <a:extLst>
-              <a:ext uri="{28A0092B-C50C-407E-A947-70E740481C1C}">
-                <a14:useLocalDpi xmlns="" xmlns:a14="http://schemas.microsoft.com/office/drawing/2010/main" val="0"/>
-              </a:ext>
-            </a:extLst>
-          </a:blip>
-          <a:srcRect/>
-          <a:stretch>
-            <a:fillRect/>
-          </a:stretch>
-        </p:blipFill>
-        <p:spPr bwMode="auto">
-          <a:xfrm>
-            <a:off x="4038600" y="1600200"/>
-            <a:ext cx="4800600" cy="3886200"/>
-          </a:xfrm>
-          <a:prstGeom prst="rect">
-            <a:avLst/>
-          </a:prstGeom>
-          <a:noFill/>
-          <a:ln>
-            <a:noFill/>
-          </a:ln>
-        </p:spPr>
-      </p:pic>
-      <p:sp>
-        <p:nvSpPr>
-          <p:cNvPr id="6" name="TextBox 5"/>
-          <p:cNvSpPr txBox="1"/>
-          <p:nvPr/>
-        </p:nvSpPr>
-        <p:spPr>
-          <a:xfrm>
-            <a:off x="3962400" y="5638800"/>
-            <a:ext cx="4495800" cy="461665"/>
-          </a:xfrm>
-          <a:prstGeom prst="rect">
-            <a:avLst/>
-          </a:prstGeom>
-          <a:noFill/>
-        </p:spPr>
-        <p:txBody>
-          <a:bodyPr wrap="square" rtlCol="0">
-            <a:spAutoFit/>
-          </a:bodyPr>
-          <a:lstStyle/>
-          <a:p>
-            <a:r>
-              <a:rPr lang="en-US" sz="2400" dirty="0" smtClean="0"/>
-              <a:t>Task Network Diagram</a:t>
-            </a:r>
-            <a:endParaRPr lang="en-US" sz="2400" dirty="0"/>
           </a:p>
         </p:txBody>
       </p:sp>
@@ -4580,13 +4458,6 @@
   <p:clrMapOvr>
     <a:masterClrMapping/>
   </p:clrMapOvr>
-  <p:timing>
-    <p:tnLst>
-      <p:par>
-        <p:cTn id="1" dur="indefinite" restart="never" nodeType="tmRoot"/>
-      </p:par>
-    </p:tnLst>
-  </p:timing>
 </p:sld>
 </file>
 
@@ -4624,57 +4495,62 @@
           <a:p>
             <a:r>
               <a:rPr lang="en-US" dirty="0" smtClean="0"/>
-              <a:t>Time Line</a:t>
+              <a:t>Hypothetical – </a:t>
+            </a:r>
+            <a:r>
+              <a:rPr lang="en-US" dirty="0" err="1" smtClean="0"/>
+              <a:t>Romando</a:t>
             </a:r>
             <a:endParaRPr lang="en-US" dirty="0"/>
           </a:p>
         </p:txBody>
       </p:sp>
-      <p:pic>
-        <p:nvPicPr>
-          <p:cNvPr id="3" name="Picture 2" descr="Macintosh HD:Users:watdahieu:Dropbox:Timeline.png"/>
-          <p:cNvPicPr/>
-          <p:nvPr/>
-        </p:nvPicPr>
-        <p:blipFill>
-          <a:blip r:embed="rId2" cstate="print">
-            <a:extLst>
-              <a:ext uri="{28A0092B-C50C-407E-A947-70E740481C1C}">
-                <a14:useLocalDpi xmlns="" xmlns:a14="http://schemas.microsoft.com/office/drawing/2010/main" val="0"/>
-              </a:ext>
-            </a:extLst>
-          </a:blip>
-          <a:srcRect/>
-          <a:stretch>
-            <a:fillRect/>
-          </a:stretch>
-        </p:blipFill>
-        <p:spPr bwMode="auto">
-          <a:xfrm>
-            <a:off x="1600517" y="1333500"/>
-            <a:ext cx="6400483" cy="4610100"/>
-          </a:xfrm>
-          <a:prstGeom prst="rect">
-            <a:avLst/>
-          </a:prstGeom>
-          <a:noFill/>
-          <a:ln>
-            <a:noFill/>
-          </a:ln>
-        </p:spPr>
-      </p:pic>
+      <p:sp>
+        <p:nvSpPr>
+          <p:cNvPr id="3" name="Content Placeholder 2"/>
+          <p:cNvSpPr>
+            <a:spLocks noGrp="1"/>
+          </p:cNvSpPr>
+          <p:nvPr>
+            <p:ph idx="1"/>
+          </p:nvPr>
+        </p:nvSpPr>
+        <p:spPr/>
+        <p:txBody>
+          <a:bodyPr/>
+          <a:lstStyle/>
+          <a:p>
+            <a:r>
+              <a:rPr lang="en-US" dirty="0" smtClean="0"/>
+              <a:t>What if we had more time?</a:t>
+            </a:r>
+          </a:p>
+          <a:p>
+            <a:endParaRPr lang="en-US" dirty="0" smtClean="0"/>
+          </a:p>
+          <a:p>
+            <a:r>
+              <a:rPr lang="en-US" dirty="0" smtClean="0"/>
+              <a:t>What if we could start over?</a:t>
+            </a:r>
+          </a:p>
+          <a:p>
+            <a:endParaRPr lang="en-US" dirty="0" smtClean="0"/>
+          </a:p>
+          <a:p>
+            <a:r>
+              <a:rPr lang="en-US" dirty="0" smtClean="0"/>
+              <a:t>What we learned</a:t>
+            </a:r>
+            <a:endParaRPr lang="en-US" dirty="0"/>
+          </a:p>
+        </p:txBody>
+      </p:sp>
     </p:spTree>
   </p:cSld>
   <p:clrMapOvr>
     <a:masterClrMapping/>
   </p:clrMapOvr>
-  <p:timing>
-    <p:tnLst>
-      <p:par>
-        <p:cTn id="1" dur="indefinite" restart="never" nodeType="tmRoot"/>
-      </p:par>
-    </p:tnLst>
-  </p:timing>
 </p:sld>
 </file>
 
@@ -4712,90 +4588,58 @@
           <a:p>
             <a:r>
               <a:rPr lang="en-US" dirty="0" smtClean="0"/>
-              <a:t>Network Diagram</a:t>
+              <a:t>Hypothetical – James</a:t>
             </a:r>
             <a:endParaRPr lang="en-US" dirty="0"/>
           </a:p>
         </p:txBody>
       </p:sp>
-      <p:pic>
-        <p:nvPicPr>
-          <p:cNvPr id="3" name="Picture 2" descr="Macintosh HD:Users:watdahieu:Dropbox:Network1.png"/>
-          <p:cNvPicPr/>
-          <p:nvPr/>
-        </p:nvPicPr>
-        <p:blipFill>
-          <a:blip r:embed="rId2" cstate="print">
-            <a:extLst>
-              <a:ext uri="{28A0092B-C50C-407E-A947-70E740481C1C}">
-                <a14:useLocalDpi xmlns="" xmlns:a14="http://schemas.microsoft.com/office/drawing/2010/main" val="0"/>
-              </a:ext>
-            </a:extLst>
-          </a:blip>
-          <a:srcRect/>
-          <a:stretch>
-            <a:fillRect/>
-          </a:stretch>
-        </p:blipFill>
-        <p:spPr bwMode="auto">
-          <a:xfrm>
-            <a:off x="0" y="1600200"/>
-            <a:ext cx="4953000" cy="3962400"/>
-          </a:xfrm>
-          <a:prstGeom prst="rect">
-            <a:avLst/>
-          </a:prstGeom>
-          <a:noFill/>
-          <a:ln>
-            <a:noFill/>
-          </a:ln>
-        </p:spPr>
-      </p:pic>
-      <p:pic>
-        <p:nvPicPr>
-          <p:cNvPr id="4" name="Picture 3" descr="Macintosh HD:Users:watdahieu:Dropbox:Network2.png"/>
-          <p:cNvPicPr/>
-          <p:nvPr/>
-        </p:nvPicPr>
-        <p:blipFill>
-          <a:blip r:embed="rId3" cstate="print">
-            <a:extLst>
-              <a:ext uri="{28A0092B-C50C-407E-A947-70E740481C1C}">
-                <a14:useLocalDpi xmlns="" xmlns:a14="http://schemas.microsoft.com/office/drawing/2010/main" val="0"/>
-              </a:ext>
-            </a:extLst>
-          </a:blip>
-          <a:srcRect r="28051" b="3846"/>
-          <a:stretch>
-            <a:fillRect/>
-          </a:stretch>
-        </p:blipFill>
-        <p:spPr bwMode="auto">
-          <a:xfrm>
-            <a:off x="4953000" y="1600200"/>
-            <a:ext cx="4191000" cy="3962400"/>
-          </a:xfrm>
-          <a:prstGeom prst="rect">
-            <a:avLst/>
-          </a:prstGeom>
-          <a:noFill/>
-          <a:ln>
-            <a:noFill/>
-          </a:ln>
-        </p:spPr>
-      </p:pic>
+      <p:sp>
+        <p:nvSpPr>
+          <p:cNvPr id="3" name="Content Placeholder 2"/>
+          <p:cNvSpPr>
+            <a:spLocks noGrp="1"/>
+          </p:cNvSpPr>
+          <p:nvPr>
+            <p:ph idx="1"/>
+          </p:nvPr>
+        </p:nvSpPr>
+        <p:spPr/>
+        <p:txBody>
+          <a:bodyPr/>
+          <a:lstStyle/>
+          <a:p>
+            <a:r>
+              <a:rPr lang="en-US" dirty="0" smtClean="0"/>
+              <a:t>What if we had more time?</a:t>
+            </a:r>
+          </a:p>
+          <a:p>
+            <a:endParaRPr lang="en-US" dirty="0" smtClean="0"/>
+          </a:p>
+          <a:p>
+            <a:r>
+              <a:rPr lang="en-US" dirty="0" smtClean="0"/>
+              <a:t>What if we could start over?</a:t>
+            </a:r>
+          </a:p>
+          <a:p>
+            <a:endParaRPr lang="en-US" dirty="0" smtClean="0"/>
+          </a:p>
+          <a:p>
+            <a:r>
+              <a:rPr lang="en-US" dirty="0" smtClean="0"/>
+              <a:t>What we learned</a:t>
+            </a:r>
+            <a:endParaRPr lang="en-US" dirty="0"/>
+          </a:p>
+        </p:txBody>
+      </p:sp>
     </p:spTree>
   </p:cSld>
   <p:clrMapOvr>
     <a:masterClrMapping/>
   </p:clrMapOvr>
-  <p:timing>
-    <p:tnLst>
-      <p:par>
-        <p:cTn id="1" dur="indefinite" restart="never" nodeType="tmRoot"/>
-      </p:par>
-    </p:tnLst>
-  </p:timing>
 </p:sld>
 </file>
 
@@ -4833,49 +4677,66 @@
           <a:p>
             <a:r>
               <a:rPr lang="en-US" dirty="0" smtClean="0"/>
-              <a:t>Interface Design</a:t>
+              <a:t>Conclusion</a:t>
             </a:r>
             <a:endParaRPr lang="en-US" dirty="0"/>
           </a:p>
         </p:txBody>
       </p:sp>
-      <p:pic>
-        <p:nvPicPr>
-          <p:cNvPr id="4" name="Content Placeholder 3" descr="Macintosh HD:Users:watdahieu:Desktop:Software:IP:A Team Documents:Diagram:UIscreenshot.png"/>
-          <p:cNvPicPr>
-            <a:picLocks noGrp="1"/>
-          </p:cNvPicPr>
-          <p:nvPr>
-            <p:ph idx="1"/>
-          </p:nvPr>
-        </p:nvPicPr>
-        <p:blipFill>
-          <a:blip r:embed="rId2" cstate="print">
-            <a:extLst>
-              <a:ext uri="{28A0092B-C50C-407E-A947-70E740481C1C}">
-                <a14:useLocalDpi xmlns="" xmlns:a14="http://schemas.microsoft.com/office/drawing/2010/main" val="0"/>
-              </a:ext>
-            </a:extLst>
-          </a:blip>
-          <a:srcRect/>
-          <a:stretch>
-            <a:fillRect/>
-          </a:stretch>
-        </p:blipFill>
-        <p:spPr bwMode="auto">
+      <p:sp>
+        <p:nvSpPr>
+          <p:cNvPr id="5" name="Content Placeholder 4"/>
+          <p:cNvSpPr>
+            <a:spLocks noGrp="1"/>
+          </p:cNvSpPr>
+          <p:nvPr>
+            <p:ph sz="half" idx="2"/>
+          </p:nvPr>
+        </p:nvSpPr>
+        <p:spPr/>
+        <p:txBody>
+          <a:bodyPr>
+            <a:normAutofit/>
+          </a:bodyPr>
+          <a:lstStyle/>
+          <a:p>
+            <a:endParaRPr lang="en-US" sz="3600" dirty="0" smtClean="0"/>
+          </a:p>
+          <a:p>
+            <a:endParaRPr lang="en-US" dirty="0" smtClean="0"/>
+          </a:p>
+          <a:p>
+            <a:endParaRPr lang="en-US" dirty="0" smtClean="0"/>
+          </a:p>
+          <a:p>
+            <a:endParaRPr lang="en-US" dirty="0"/>
+          </a:p>
+        </p:txBody>
+      </p:sp>
+      <p:sp>
+        <p:nvSpPr>
+          <p:cNvPr id="6" name="Content Placeholder 5"/>
+          <p:cNvSpPr>
+            <a:spLocks noGrp="1"/>
+          </p:cNvSpPr>
+          <p:nvPr>
+            <p:ph sz="half" idx="1"/>
+          </p:nvPr>
+        </p:nvSpPr>
+        <p:spPr>
           <a:xfrm>
-            <a:off x="2133600" y="1295400"/>
-            <a:ext cx="5029200" cy="4648200"/>
+            <a:off x="457200" y="1600200"/>
+            <a:ext cx="8153400" cy="4525963"/>
           </a:xfrm>
-          <a:prstGeom prst="rect">
-            <a:avLst/>
-          </a:prstGeom>
-          <a:noFill/>
-          <a:ln>
-            <a:noFill/>
-          </a:ln>
         </p:spPr>
-      </p:pic>
+        <p:txBody>
+          <a:bodyPr/>
+          <a:lstStyle/>
+          <a:p>
+            <a:endParaRPr lang="en-US" dirty="0"/>
+          </a:p>
+        </p:txBody>
+      </p:sp>
     </p:spTree>
   </p:cSld>
   <p:clrMapOvr>
@@ -4892,454 +4753,6 @@
 </file>
 
 <file path=ppt/slides/slide15.xml><?xml version="1.0" encoding="utf-8"?>
-<p:sld xmlns:a="http://schemas.openxmlformats.org/drawingml/2006/main" xmlns:r="http://schemas.openxmlformats.org/officeDocument/2006/relationships" xmlns:p="http://schemas.openxmlformats.org/presentationml/2006/main">
-  <p:cSld>
-    <p:spTree>
-      <p:nvGrpSpPr>
-        <p:cNvPr id="1" name=""/>
-        <p:cNvGrpSpPr/>
-        <p:nvPr/>
-      </p:nvGrpSpPr>
-      <p:grpSpPr>
-        <a:xfrm>
-          <a:off x="0" y="0"/>
-          <a:ext cx="0" cy="0"/>
-          <a:chOff x="0" y="0"/>
-          <a:chExt cx="0" cy="0"/>
-        </a:xfrm>
-      </p:grpSpPr>
-      <p:sp>
-        <p:nvSpPr>
-          <p:cNvPr id="2" name="Title 1"/>
-          <p:cNvSpPr>
-            <a:spLocks noGrp="1"/>
-          </p:cNvSpPr>
-          <p:nvPr>
-            <p:ph type="title"/>
-          </p:nvPr>
-        </p:nvSpPr>
-        <p:spPr/>
-        <p:txBody>
-          <a:bodyPr/>
-          <a:lstStyle/>
-          <a:p>
-            <a:r>
-              <a:rPr lang="en-US" dirty="0" smtClean="0"/>
-              <a:t>UML Use Case Diagram</a:t>
-            </a:r>
-            <a:endParaRPr lang="en-US" dirty="0"/>
-          </a:p>
-        </p:txBody>
-      </p:sp>
-      <p:pic>
-        <p:nvPicPr>
-          <p:cNvPr id="5" name="Content Placeholder 3" descr="UseCase.png"/>
-          <p:cNvPicPr>
-            <a:picLocks noGrp="1" noChangeAspect="1"/>
-          </p:cNvPicPr>
-          <p:nvPr>
-            <p:ph idx="1"/>
-          </p:nvPr>
-        </p:nvPicPr>
-        <p:blipFill>
-          <a:blip r:embed="rId2" cstate="print">
-            <a:extLst>
-              <a:ext uri="{28A0092B-C50C-407E-A947-70E740481C1C}">
-                <a14:useLocalDpi xmlns="" xmlns:a14="http://schemas.microsoft.com/office/drawing/2010/main" val="0"/>
-              </a:ext>
-            </a:extLst>
-          </a:blip>
-          <a:srcRect l="-62315" r="-62315"/>
-          <a:stretch>
-            <a:fillRect/>
-          </a:stretch>
-        </p:blipFill>
-        <p:spPr>
-          <a:xfrm>
-            <a:off x="304800" y="1600200"/>
-            <a:ext cx="8042276" cy="4343400"/>
-          </a:xfrm>
-        </p:spPr>
-      </p:pic>
-    </p:spTree>
-  </p:cSld>
-  <p:clrMapOvr>
-    <a:masterClrMapping/>
-  </p:clrMapOvr>
-  <p:timing>
-    <p:tnLst>
-      <p:par>
-        <p:cTn id="1" dur="indefinite" restart="never" nodeType="tmRoot"/>
-      </p:par>
-    </p:tnLst>
-  </p:timing>
-</p:sld>
-</file>
-
-<file path=ppt/slides/slide16.xml><?xml version="1.0" encoding="utf-8"?>
-<p:sld xmlns:a="http://schemas.openxmlformats.org/drawingml/2006/main" xmlns:r="http://schemas.openxmlformats.org/officeDocument/2006/relationships" xmlns:p="http://schemas.openxmlformats.org/presentationml/2006/main">
-  <p:cSld>
-    <p:spTree>
-      <p:nvGrpSpPr>
-        <p:cNvPr id="1" name=""/>
-        <p:cNvGrpSpPr/>
-        <p:nvPr/>
-      </p:nvGrpSpPr>
-      <p:grpSpPr>
-        <a:xfrm>
-          <a:off x="0" y="0"/>
-          <a:ext cx="0" cy="0"/>
-          <a:chOff x="0" y="0"/>
-          <a:chExt cx="0" cy="0"/>
-        </a:xfrm>
-      </p:grpSpPr>
-      <p:sp>
-        <p:nvSpPr>
-          <p:cNvPr id="2" name="Title 1"/>
-          <p:cNvSpPr>
-            <a:spLocks noGrp="1"/>
-          </p:cNvSpPr>
-          <p:nvPr>
-            <p:ph type="title"/>
-          </p:nvPr>
-        </p:nvSpPr>
-        <p:spPr/>
-        <p:txBody>
-          <a:bodyPr/>
-          <a:lstStyle/>
-          <a:p>
-            <a:r>
-              <a:rPr lang="en-US" dirty="0" smtClean="0"/>
-              <a:t>UML Sequence Diagram</a:t>
-            </a:r>
-            <a:endParaRPr lang="en-US" dirty="0"/>
-          </a:p>
-        </p:txBody>
-      </p:sp>
-      <p:pic>
-        <p:nvPicPr>
-          <p:cNvPr id="4" name="Content Placeholder 3" descr="Sequence Diagram.png"/>
-          <p:cNvPicPr>
-            <a:picLocks noGrp="1" noChangeAspect="1"/>
-          </p:cNvPicPr>
-          <p:nvPr>
-            <p:ph idx="1"/>
-          </p:nvPr>
-        </p:nvPicPr>
-        <p:blipFill>
-          <a:blip r:embed="rId2" cstate="print">
-            <a:extLst>
-              <a:ext uri="{28A0092B-C50C-407E-A947-70E740481C1C}">
-                <a14:useLocalDpi xmlns="" xmlns:a14="http://schemas.microsoft.com/office/drawing/2010/main" val="0"/>
-              </a:ext>
-            </a:extLst>
-          </a:blip>
-          <a:stretch>
-            <a:fillRect/>
-          </a:stretch>
-        </p:blipFill>
-        <p:spPr>
-          <a:xfrm>
-            <a:off x="1143000" y="1447800"/>
-            <a:ext cx="6963020" cy="4525963"/>
-          </a:xfrm>
-          <a:prstGeom prst="rect">
-            <a:avLst/>
-          </a:prstGeom>
-        </p:spPr>
-      </p:pic>
-    </p:spTree>
-  </p:cSld>
-  <p:clrMapOvr>
-    <a:masterClrMapping/>
-  </p:clrMapOvr>
-  <p:timing>
-    <p:tnLst>
-      <p:par>
-        <p:cTn id="1" dur="indefinite" restart="never" nodeType="tmRoot"/>
-      </p:par>
-    </p:tnLst>
-  </p:timing>
-</p:sld>
-</file>
-
-<file path=ppt/slides/slide17.xml><?xml version="1.0" encoding="utf-8"?>
-<p:sld xmlns:a="http://schemas.openxmlformats.org/drawingml/2006/main" xmlns:r="http://schemas.openxmlformats.org/officeDocument/2006/relationships" xmlns:p="http://schemas.openxmlformats.org/presentationml/2006/main">
-  <p:cSld>
-    <p:spTree>
-      <p:nvGrpSpPr>
-        <p:cNvPr id="1" name=""/>
-        <p:cNvGrpSpPr/>
-        <p:nvPr/>
-      </p:nvGrpSpPr>
-      <p:grpSpPr>
-        <a:xfrm>
-          <a:off x="0" y="0"/>
-          <a:ext cx="0" cy="0"/>
-          <a:chOff x="0" y="0"/>
-          <a:chExt cx="0" cy="0"/>
-        </a:xfrm>
-      </p:grpSpPr>
-      <p:sp>
-        <p:nvSpPr>
-          <p:cNvPr id="2" name="Title 1"/>
-          <p:cNvSpPr>
-            <a:spLocks noGrp="1"/>
-          </p:cNvSpPr>
-          <p:nvPr>
-            <p:ph type="title"/>
-          </p:nvPr>
-        </p:nvSpPr>
-        <p:spPr/>
-        <p:txBody>
-          <a:bodyPr/>
-          <a:lstStyle/>
-          <a:p>
-            <a:r>
-              <a:rPr lang="en-US" dirty="0" smtClean="0"/>
-              <a:t>UML Class Diagram</a:t>
-            </a:r>
-            <a:endParaRPr lang="en-US" dirty="0"/>
-          </a:p>
-        </p:txBody>
-      </p:sp>
-      <p:pic>
-        <p:nvPicPr>
-          <p:cNvPr id="3" name="Picture 2" descr="Class Diagram.png"/>
-          <p:cNvPicPr>
-            <a:picLocks noChangeAspect="1"/>
-          </p:cNvPicPr>
-          <p:nvPr/>
-        </p:nvPicPr>
-        <p:blipFill>
-          <a:blip r:embed="rId2" cstate="print">
-            <a:extLst>
-              <a:ext uri="{28A0092B-C50C-407E-A947-70E740481C1C}">
-                <a14:useLocalDpi xmlns="" xmlns:a14="http://schemas.microsoft.com/office/drawing/2010/main" val="0"/>
-              </a:ext>
-            </a:extLst>
-          </a:blip>
-          <a:stretch>
-            <a:fillRect/>
-          </a:stretch>
-        </p:blipFill>
-        <p:spPr>
-          <a:xfrm>
-            <a:off x="1066800" y="1295400"/>
-            <a:ext cx="7266989" cy="5247120"/>
-          </a:xfrm>
-          <a:prstGeom prst="rect">
-            <a:avLst/>
-          </a:prstGeom>
-        </p:spPr>
-      </p:pic>
-    </p:spTree>
-  </p:cSld>
-  <p:clrMapOvr>
-    <a:masterClrMapping/>
-  </p:clrMapOvr>
-  <p:timing>
-    <p:tnLst>
-      <p:par>
-        <p:cTn id="1" dur="indefinite" restart="never" nodeType="tmRoot"/>
-      </p:par>
-    </p:tnLst>
-  </p:timing>
-</p:sld>
-</file>
-
-<file path=ppt/slides/slide18.xml><?xml version="1.0" encoding="utf-8"?>
-<p:sld xmlns:a="http://schemas.openxmlformats.org/drawingml/2006/main" xmlns:r="http://schemas.openxmlformats.org/officeDocument/2006/relationships" xmlns:p="http://schemas.openxmlformats.org/presentationml/2006/main">
-  <p:cSld>
-    <p:spTree>
-      <p:nvGrpSpPr>
-        <p:cNvPr id="1" name=""/>
-        <p:cNvGrpSpPr/>
-        <p:nvPr/>
-      </p:nvGrpSpPr>
-      <p:grpSpPr>
-        <a:xfrm>
-          <a:off x="0" y="0"/>
-          <a:ext cx="0" cy="0"/>
-          <a:chOff x="0" y="0"/>
-          <a:chExt cx="0" cy="0"/>
-        </a:xfrm>
-      </p:grpSpPr>
-      <p:sp>
-        <p:nvSpPr>
-          <p:cNvPr id="2" name="Title 1"/>
-          <p:cNvSpPr>
-            <a:spLocks noGrp="1"/>
-          </p:cNvSpPr>
-          <p:nvPr>
-            <p:ph type="title"/>
-          </p:nvPr>
-        </p:nvSpPr>
-        <p:spPr/>
-        <p:txBody>
-          <a:bodyPr/>
-          <a:lstStyle/>
-          <a:p>
-            <a:r>
-              <a:rPr lang="en-US" dirty="0" smtClean="0"/>
-              <a:t>Conclusion</a:t>
-            </a:r>
-            <a:endParaRPr lang="en-US" dirty="0"/>
-          </a:p>
-        </p:txBody>
-      </p:sp>
-      <p:sp>
-        <p:nvSpPr>
-          <p:cNvPr id="3" name="Content Placeholder 2"/>
-          <p:cNvSpPr>
-            <a:spLocks noGrp="1"/>
-          </p:cNvSpPr>
-          <p:nvPr>
-            <p:ph sz="half" idx="1"/>
-          </p:nvPr>
-        </p:nvSpPr>
-        <p:spPr/>
-        <p:txBody>
-          <a:bodyPr>
-            <a:normAutofit/>
-          </a:bodyPr>
-          <a:lstStyle/>
-          <a:p>
-            <a:r>
-              <a:rPr lang="en-US" sz="4000" dirty="0" smtClean="0"/>
-              <a:t>Accomplished</a:t>
-            </a:r>
-          </a:p>
-          <a:p>
-            <a:pPr lvl="1"/>
-            <a:r>
-              <a:rPr lang="en-US" sz="2800" dirty="0" smtClean="0"/>
-              <a:t>Requirement Documents</a:t>
-            </a:r>
-          </a:p>
-          <a:p>
-            <a:pPr lvl="1"/>
-            <a:r>
-              <a:rPr lang="en-US" sz="2800" dirty="0" smtClean="0"/>
-              <a:t>Planning</a:t>
-            </a:r>
-          </a:p>
-          <a:p>
-            <a:pPr lvl="1"/>
-            <a:r>
-              <a:rPr lang="en-US" sz="2800" dirty="0" smtClean="0"/>
-              <a:t>Meetings with Client</a:t>
-            </a:r>
-          </a:p>
-          <a:p>
-            <a:pPr lvl="1"/>
-            <a:r>
-              <a:rPr lang="en-US" sz="2800" dirty="0" smtClean="0"/>
-              <a:t>User Interface</a:t>
-            </a:r>
-          </a:p>
-          <a:p>
-            <a:pPr lvl="1"/>
-            <a:r>
-              <a:rPr lang="en-US" sz="2800" dirty="0" smtClean="0"/>
-              <a:t>Diagrams</a:t>
-            </a:r>
-          </a:p>
-          <a:p>
-            <a:endParaRPr lang="en-US" dirty="0" smtClean="0"/>
-          </a:p>
-          <a:p>
-            <a:endParaRPr lang="en-US" dirty="0"/>
-          </a:p>
-        </p:txBody>
-      </p:sp>
-      <p:sp>
-        <p:nvSpPr>
-          <p:cNvPr id="5" name="Content Placeholder 4"/>
-          <p:cNvSpPr>
-            <a:spLocks noGrp="1"/>
-          </p:cNvSpPr>
-          <p:nvPr>
-            <p:ph sz="half" idx="2"/>
-          </p:nvPr>
-        </p:nvSpPr>
-        <p:spPr/>
-        <p:txBody>
-          <a:bodyPr>
-            <a:normAutofit/>
-          </a:bodyPr>
-          <a:lstStyle/>
-          <a:p>
-            <a:r>
-              <a:rPr lang="en-US" sz="4000" dirty="0" smtClean="0"/>
-              <a:t>Future Work</a:t>
-            </a:r>
-          </a:p>
-          <a:p>
-            <a:pPr lvl="1"/>
-            <a:r>
-              <a:rPr lang="en-US" sz="2800" dirty="0" smtClean="0"/>
-              <a:t>Prototype</a:t>
-            </a:r>
-          </a:p>
-          <a:p>
-            <a:pPr lvl="1"/>
-            <a:r>
-              <a:rPr lang="en-US" sz="2800" dirty="0" smtClean="0"/>
-              <a:t>Testing</a:t>
-            </a:r>
-          </a:p>
-          <a:p>
-            <a:pPr lvl="1"/>
-            <a:r>
-              <a:rPr lang="en-US" sz="2800" dirty="0" smtClean="0"/>
-              <a:t>Testing Document</a:t>
-            </a:r>
-          </a:p>
-          <a:p>
-            <a:pPr lvl="1"/>
-            <a:r>
-              <a:rPr lang="en-US" sz="2800" dirty="0" smtClean="0"/>
-              <a:t>Final Product</a:t>
-            </a:r>
-          </a:p>
-          <a:p>
-            <a:pPr lvl="1"/>
-            <a:r>
-              <a:rPr lang="en-US" sz="2800" dirty="0" smtClean="0"/>
-              <a:t>Final Product Presentation</a:t>
-            </a:r>
-          </a:p>
-          <a:p>
-            <a:endParaRPr lang="en-US" sz="3600" dirty="0" smtClean="0"/>
-          </a:p>
-          <a:p>
-            <a:endParaRPr lang="en-US" dirty="0" smtClean="0"/>
-          </a:p>
-          <a:p>
-            <a:endParaRPr lang="en-US" dirty="0" smtClean="0"/>
-          </a:p>
-          <a:p>
-            <a:endParaRPr lang="en-US" dirty="0"/>
-          </a:p>
-        </p:txBody>
-      </p:sp>
-    </p:spTree>
-  </p:cSld>
-  <p:clrMapOvr>
-    <a:masterClrMapping/>
-  </p:clrMapOvr>
-  <p:timing>
-    <p:tnLst>
-      <p:par>
-        <p:cTn id="1" dur="indefinite" restart="never" nodeType="tmRoot"/>
-      </p:par>
-    </p:tnLst>
-  </p:timing>
-</p:sld>
-</file>
-
-<file path=ppt/slides/slide19.xml><?xml version="1.0" encoding="utf-8"?>
 <p:sld xmlns:a="http://schemas.openxmlformats.org/drawingml/2006/main" xmlns:r="http://schemas.openxmlformats.org/officeDocument/2006/relationships" xmlns:p="http://schemas.openxmlformats.org/presentationml/2006/main">
   <p:cSld>
     <p:spTree>
@@ -5650,284 +5063,6 @@
     <p:tnLst>
       <p:par>
         <p:cTn id="1" dur="indefinite" restart="never" nodeType="tmRoot"/>
-      </p:par>
-    </p:tnLst>
-  </p:timing>
-</p:sld>
-</file>
-
-<file path=ppt/slides/slide20.xml><?xml version="1.0" encoding="utf-8"?>
-<p:sld xmlns:a="http://schemas.openxmlformats.org/drawingml/2006/main" xmlns:r="http://schemas.openxmlformats.org/officeDocument/2006/relationships" xmlns:p="http://schemas.openxmlformats.org/presentationml/2006/main">
-  <p:cSld>
-    <p:spTree>
-      <p:nvGrpSpPr>
-        <p:cNvPr id="1" name=""/>
-        <p:cNvGrpSpPr/>
-        <p:nvPr/>
-      </p:nvGrpSpPr>
-      <p:grpSpPr>
-        <a:xfrm>
-          <a:off x="0" y="0"/>
-          <a:ext cx="0" cy="0"/>
-          <a:chOff x="0" y="0"/>
-          <a:chExt cx="0" cy="0"/>
-        </a:xfrm>
-      </p:grpSpPr>
-      <p:sp>
-        <p:nvSpPr>
-          <p:cNvPr id="2" name="Title 1"/>
-          <p:cNvSpPr>
-            <a:spLocks noGrp="1"/>
-          </p:cNvSpPr>
-          <p:nvPr>
-            <p:ph type="title"/>
-          </p:nvPr>
-        </p:nvSpPr>
-        <p:spPr/>
-        <p:txBody>
-          <a:bodyPr/>
-          <a:lstStyle/>
-          <a:p>
-            <a:r>
-              <a:rPr lang="en-US" dirty="0" smtClean="0"/>
-              <a:t>Demo</a:t>
-            </a:r>
-            <a:endParaRPr lang="en-US" dirty="0"/>
-          </a:p>
-        </p:txBody>
-      </p:sp>
-      <p:pic>
-        <p:nvPicPr>
-          <p:cNvPr id="3" name="TestDataVideo.mp4">
-            <a:hlinkClick r:id="" action="ppaction://media"/>
-          </p:cNvPr>
-          <p:cNvPicPr>
-            <a:picLocks noRot="1" noChangeAspect="1"/>
-          </p:cNvPicPr>
-          <p:nvPr>
-            <a:videoFile r:link="rId1"/>
-          </p:nvPr>
-        </p:nvPicPr>
-        <p:blipFill>
-          <a:blip r:embed="rId4" cstate="print"/>
-          <a:stretch>
-            <a:fillRect/>
-          </a:stretch>
-        </p:blipFill>
-        <p:spPr>
-          <a:xfrm>
-            <a:off x="0" y="1828800"/>
-            <a:ext cx="4495800" cy="3371850"/>
-          </a:xfrm>
-          <a:prstGeom prst="rect">
-            <a:avLst/>
-          </a:prstGeom>
-        </p:spPr>
-      </p:pic>
-      <p:pic>
-        <p:nvPicPr>
-          <p:cNvPr id="4" name="TestDataProcessedVideo.mp4">
-            <a:hlinkClick r:id="" action="ppaction://media"/>
-          </p:cNvPr>
-          <p:cNvPicPr>
-            <a:picLocks noRot="1" noChangeAspect="1"/>
-          </p:cNvPicPr>
-          <p:nvPr>
-            <a:videoFile r:link="rId2"/>
-          </p:nvPr>
-        </p:nvPicPr>
-        <p:blipFill>
-          <a:blip r:embed="rId4" cstate="print"/>
-          <a:stretch>
-            <a:fillRect/>
-          </a:stretch>
-        </p:blipFill>
-        <p:spPr>
-          <a:xfrm>
-            <a:off x="4648200" y="1828800"/>
-            <a:ext cx="4495800" cy="3371850"/>
-          </a:xfrm>
-          <a:prstGeom prst="rect">
-            <a:avLst/>
-          </a:prstGeom>
-        </p:spPr>
-      </p:pic>
-    </p:spTree>
-  </p:cSld>
-  <p:clrMapOvr>
-    <a:masterClrMapping/>
-  </p:clrMapOvr>
-  <p:timing>
-    <p:tnLst>
-      <p:par>
-        <p:cTn id="1" dur="indefinite" restart="never" nodeType="tmRoot">
-          <p:childTnLst>
-            <p:seq concurrent="1" nextAc="seek">
-              <p:cTn id="2" restart="whenNotActive" fill="hold" evtFilter="cancelBubble" nodeType="interactiveSeq">
-                <p:stCondLst>
-                  <p:cond evt="onClick" delay="0">
-                    <p:tgtEl>
-                      <p:spTgt spid="3"/>
-                    </p:tgtEl>
-                  </p:cond>
-                </p:stCondLst>
-                <p:endSync evt="end" delay="0">
-                  <p:rtn val="all"/>
-                </p:endSync>
-                <p:childTnLst>
-                  <p:par>
-                    <p:cTn id="3" fill="hold">
-                      <p:stCondLst>
-                        <p:cond delay="0"/>
-                      </p:stCondLst>
-                      <p:childTnLst>
-                        <p:par>
-                          <p:cTn id="4" fill="hold">
-                            <p:stCondLst>
-                              <p:cond delay="0"/>
-                            </p:stCondLst>
-                            <p:childTnLst>
-                              <p:par>
-                                <p:cTn id="5" presetID="2" presetClass="mediacall" presetSubtype="0" fill="hold" nodeType="clickEffect">
-                                  <p:stCondLst>
-                                    <p:cond delay="0"/>
-                                  </p:stCondLst>
-                                  <p:childTnLst>
-                                    <p:cmd type="call" cmd="togglePause">
-                                      <p:cBhvr>
-                                        <p:cTn id="6" dur="1" fill="hold"/>
-                                        <p:tgtEl>
-                                          <p:spTgt spid="3"/>
-                                        </p:tgtEl>
-                                      </p:cBhvr>
-                                    </p:cmd>
-                                  </p:childTnLst>
-                                </p:cTn>
-                              </p:par>
-                            </p:childTnLst>
-                          </p:cTn>
-                        </p:par>
-                      </p:childTnLst>
-                    </p:cTn>
-                  </p:par>
-                </p:childTnLst>
-              </p:cTn>
-              <p:nextCondLst>
-                <p:cond evt="onClick" delay="0">
-                  <p:tgtEl>
-                    <p:spTgt spid="3"/>
-                  </p:tgtEl>
-                </p:cond>
-              </p:nextCondLst>
-            </p:seq>
-            <p:video>
-              <p:cMediaNode>
-                <p:cTn id="7" repeatCount="indefinite" fill="hold" display="0">
-                  <p:stCondLst>
-                    <p:cond delay="indefinite"/>
-                  </p:stCondLst>
-                  <p:endCondLst>
-                    <p:cond evt="onNext" delay="0">
-                      <p:tgtEl>
-                        <p:sldTgt/>
-                      </p:tgtEl>
-                    </p:cond>
-                    <p:cond evt="onPrev" delay="0">
-                      <p:tgtEl>
-                        <p:sldTgt/>
-                      </p:tgtEl>
-                    </p:cond>
-                  </p:endCondLst>
-                </p:cTn>
-                <p:tgtEl>
-                  <p:spTgt spid="3"/>
-                </p:tgtEl>
-              </p:cMediaNode>
-            </p:video>
-            <p:seq concurrent="1" nextAc="seek">
-              <p:cTn id="8" restart="whenNotActive" fill="hold" evtFilter="cancelBubble" nodeType="interactiveSeq">
-                <p:stCondLst>
-                  <p:cond evt="onClick" delay="0">
-                    <p:tgtEl>
-                      <p:spTgt spid="4"/>
-                    </p:tgtEl>
-                  </p:cond>
-                </p:stCondLst>
-                <p:endSync evt="end" delay="0">
-                  <p:rtn val="all"/>
-                </p:endSync>
-                <p:childTnLst>
-                  <p:par>
-                    <p:cTn id="9" fill="hold">
-                      <p:stCondLst>
-                        <p:cond delay="0"/>
-                      </p:stCondLst>
-                      <p:childTnLst>
-                        <p:par>
-                          <p:cTn id="10" fill="hold">
-                            <p:stCondLst>
-                              <p:cond delay="0"/>
-                            </p:stCondLst>
-                            <p:childTnLst>
-                              <p:par>
-                                <p:cTn id="11" presetID="2" presetClass="mediacall" presetSubtype="0" fill="hold" nodeType="clickEffect">
-                                  <p:stCondLst>
-                                    <p:cond delay="0"/>
-                                  </p:stCondLst>
-                                  <p:childTnLst>
-                                    <p:cmd type="call" cmd="togglePause">
-                                      <p:cBhvr>
-                                        <p:cTn id="12" dur="1" fill="hold"/>
-                                        <p:tgtEl>
-                                          <p:spTgt spid="4"/>
-                                        </p:tgtEl>
-                                      </p:cBhvr>
-                                    </p:cmd>
-                                  </p:childTnLst>
-                                </p:cTn>
-                              </p:par>
-                            </p:childTnLst>
-                          </p:cTn>
-                        </p:par>
-                      </p:childTnLst>
-                    </p:cTn>
-                  </p:par>
-                </p:childTnLst>
-              </p:cTn>
-              <p:nextCondLst>
-                <p:cond evt="onClick" delay="0">
-                  <p:tgtEl>
-                    <p:spTgt spid="4"/>
-                  </p:tgtEl>
-                </p:cond>
-              </p:nextCondLst>
-            </p:seq>
-            <p:video>
-              <p:cMediaNode>
-                <p:cTn id="13" repeatCount="indefinite" fill="hold" display="0">
-                  <p:stCondLst>
-                    <p:cond delay="indefinite"/>
-                  </p:stCondLst>
-                  <p:endCondLst>
-                    <p:cond evt="onNext" delay="0">
-                      <p:tgtEl>
-                        <p:sldTgt/>
-                      </p:tgtEl>
-                    </p:cond>
-                    <p:cond evt="onPrev" delay="0">
-                      <p:tgtEl>
-                        <p:sldTgt/>
-                      </p:tgtEl>
-                    </p:cond>
-                  </p:endCondLst>
-                </p:cTn>
-                <p:tgtEl>
-                  <p:spTgt spid="4"/>
-                </p:tgtEl>
-              </p:cMediaNode>
-            </p:video>
-          </p:childTnLst>
-        </p:cTn>
       </p:par>
     </p:tnLst>
   </p:timing>
@@ -6354,64 +5489,7 @@
           <a:p>
             <a:r>
               <a:rPr lang="en-US" dirty="0" smtClean="0"/>
-              <a:t>Previous Version</a:t>
-            </a:r>
-            <a:endParaRPr lang="en-US" dirty="0"/>
-          </a:p>
-        </p:txBody>
-      </p:sp>
-      <p:sp>
-        <p:nvSpPr>
-          <p:cNvPr id="3" name="Content Placeholder 2"/>
-          <p:cNvSpPr>
-            <a:spLocks noGrp="1"/>
-          </p:cNvSpPr>
-          <p:nvPr>
-            <p:ph idx="1"/>
-          </p:nvPr>
-        </p:nvSpPr>
-        <p:spPr/>
-        <p:txBody>
-          <a:bodyPr/>
-          <a:lstStyle/>
-          <a:p>
-            <a:r>
-              <a:rPr lang="en-US" dirty="0" smtClean="0"/>
-              <a:t>Loaded folder of images</a:t>
-            </a:r>
-          </a:p>
-          <a:p>
-            <a:r>
-              <a:rPr lang="en-US" dirty="0" smtClean="0"/>
-              <a:t>Initially determined needle and surface location by using base image (no droplet)</a:t>
-            </a:r>
-          </a:p>
-          <a:p>
-            <a:r>
-              <a:rPr lang="en-US" dirty="0" smtClean="0"/>
-              <a:t>From determination, was able to isolate the drop and calculate </a:t>
-            </a:r>
-            <a:r>
-              <a:rPr lang="en-US" dirty="0" err="1" smtClean="0"/>
-              <a:t>centroid</a:t>
-            </a:r>
-            <a:r>
-              <a:rPr lang="en-US" dirty="0" smtClean="0"/>
-              <a:t>, velocity, and acceleration at each image point</a:t>
-            </a:r>
-          </a:p>
-          <a:p>
-            <a:r>
-              <a:rPr lang="en-US" dirty="0" smtClean="0"/>
-              <a:t>Created .</a:t>
-            </a:r>
-            <a:r>
-              <a:rPr lang="en-US" dirty="0" err="1" smtClean="0"/>
-              <a:t>csv</a:t>
-            </a:r>
-            <a:r>
-              <a:rPr lang="en-US" dirty="0" smtClean="0"/>
-              <a:t> file with data</a:t>
+              <a:t>Demonstration</a:t>
             </a:r>
             <a:endParaRPr lang="en-US" dirty="0"/>
           </a:p>
@@ -6422,13 +5500,6 @@
   <p:clrMapOvr>
     <a:masterClrMapping/>
   </p:clrMapOvr>
-  <p:timing>
-    <p:tnLst>
-      <p:par>
-        <p:cTn id="1" dur="indefinite" restart="never" nodeType="tmRoot"/>
-      </p:par>
-    </p:tnLst>
-  </p:timing>
 </p:sld>
 </file>
 
@@ -6466,121 +5537,8 @@
           <a:p>
             <a:r>
               <a:rPr lang="en-US" dirty="0" smtClean="0"/>
-              <a:t>New Objectives</a:t>
-            </a:r>
-            <a:endParaRPr lang="en-US" dirty="0"/>
-          </a:p>
-        </p:txBody>
-      </p:sp>
-      <p:sp>
-        <p:nvSpPr>
-          <p:cNvPr id="3" name="Content Placeholder 2"/>
-          <p:cNvSpPr>
-            <a:spLocks noGrp="1"/>
-          </p:cNvSpPr>
-          <p:nvPr>
-            <p:ph idx="1"/>
-          </p:nvPr>
-        </p:nvSpPr>
-        <p:spPr/>
-        <p:txBody>
-          <a:bodyPr>
-            <a:normAutofit/>
-          </a:bodyPr>
-          <a:lstStyle/>
-          <a:p>
-            <a:r>
-              <a:rPr lang="en-US" dirty="0" smtClean="0">
-                <a:solidFill>
-                  <a:srgbClr val="D00045"/>
-                </a:solidFill>
-              </a:rPr>
-              <a:t>Remove</a:t>
-            </a:r>
-            <a:r>
-              <a:rPr lang="en-US" dirty="0" smtClean="0"/>
-              <a:t> use of base image</a:t>
-            </a:r>
-          </a:p>
-          <a:p>
-            <a:r>
-              <a:rPr lang="en-US" dirty="0" smtClean="0"/>
-              <a:t>Calculate drop </a:t>
-            </a:r>
-            <a:r>
-              <a:rPr lang="en-US" dirty="0" smtClean="0">
-                <a:solidFill>
-                  <a:srgbClr val="C00000"/>
-                </a:solidFill>
-              </a:rPr>
-              <a:t>volume</a:t>
-            </a:r>
-          </a:p>
-          <a:p>
-            <a:r>
-              <a:rPr lang="en-US" dirty="0" smtClean="0"/>
-              <a:t>Generate </a:t>
-            </a:r>
-            <a:r>
-              <a:rPr lang="en-US" dirty="0" smtClean="0">
-                <a:solidFill>
-                  <a:srgbClr val="D00045"/>
-                </a:solidFill>
-              </a:rPr>
-              <a:t>graphs</a:t>
-            </a:r>
-            <a:r>
-              <a:rPr lang="en-US" dirty="0" smtClean="0"/>
-              <a:t> for velocity and acceleration as a function of time</a:t>
-            </a:r>
-          </a:p>
-          <a:p>
-            <a:r>
-              <a:rPr lang="en-US" dirty="0" smtClean="0"/>
-              <a:t>Clean up code (unreadable)</a:t>
-            </a:r>
-          </a:p>
-          <a:p>
-            <a:r>
-              <a:rPr lang="en-US" dirty="0" smtClean="0"/>
-              <a:t>Make system more </a:t>
-            </a:r>
-            <a:r>
-              <a:rPr lang="en-US" dirty="0" smtClean="0">
-                <a:solidFill>
-                  <a:srgbClr val="D00045"/>
-                </a:solidFill>
-              </a:rPr>
-              <a:t>automated </a:t>
-            </a:r>
-            <a:r>
-              <a:rPr lang="en-US" dirty="0" smtClean="0"/>
-              <a:t>(less user interaction) and </a:t>
-            </a:r>
-            <a:r>
-              <a:rPr lang="en-US" dirty="0" smtClean="0">
-                <a:solidFill>
-                  <a:srgbClr val="D00045"/>
-                </a:solidFill>
-              </a:rPr>
-              <a:t>faster</a:t>
-            </a:r>
-          </a:p>
-          <a:p>
-            <a:r>
-              <a:rPr lang="en-US" dirty="0" smtClean="0"/>
-              <a:t>Conversion of pixel units to </a:t>
-            </a:r>
-            <a:r>
-              <a:rPr lang="en-US" dirty="0" smtClean="0">
-                <a:solidFill>
-                  <a:srgbClr val="D00045"/>
-                </a:solidFill>
-              </a:rPr>
-              <a:t>real-world units</a:t>
-            </a:r>
-          </a:p>
-          <a:p>
+              <a:t>Test Report</a:t>
+            </a:r>
             <a:endParaRPr lang="en-US" dirty="0"/>
           </a:p>
         </p:txBody>
@@ -6590,13 +5548,6 @@
   <p:clrMapOvr>
     <a:masterClrMapping/>
   </p:clrMapOvr>
-  <p:timing>
-    <p:tnLst>
-      <p:par>
-        <p:cTn id="1" dur="indefinite" restart="never" nodeType="tmRoot"/>
-      </p:par>
-    </p:tnLst>
-  </p:timing>
 </p:sld>
 </file>
 
@@ -6634,7 +5585,7 @@
           <a:p>
             <a:r>
               <a:rPr lang="en-US" dirty="0" smtClean="0"/>
-              <a:t>Big-Picture Plan</a:t>
+              <a:t>Deployment Issues</a:t>
             </a:r>
             <a:endParaRPr lang="en-US" dirty="0"/>
           </a:p>
@@ -6655,25 +5606,7 @@
           <a:bodyPr/>
           <a:lstStyle/>
           <a:p>
-            <a:r>
-              <a:rPr lang="en-US" dirty="0" smtClean="0"/>
-              <a:t>Start new project with OOP structure and utilize working components from Version 1</a:t>
-            </a:r>
-          </a:p>
-          <a:p>
-            <a:r>
-              <a:rPr lang="en-US" dirty="0" smtClean="0"/>
-              <a:t>Re-design GUI</a:t>
-            </a:r>
-          </a:p>
-          <a:p>
-            <a:r>
-              <a:rPr lang="en-US" dirty="0" smtClean="0"/>
-              <a:t>Use multithreading to maximize processing speed</a:t>
-            </a:r>
-          </a:p>
-          <a:p>
-            <a:endParaRPr lang="en-US" dirty="0" smtClean="0"/>
+            <a:endParaRPr lang="en-US" dirty="0"/>
           </a:p>
         </p:txBody>
       </p:sp>
@@ -6726,7 +5659,7 @@
           <a:p>
             <a:r>
               <a:rPr lang="en-US" dirty="0" smtClean="0"/>
-              <a:t>SDLC: Waterfall Model</a:t>
+              <a:t>Project Deviations</a:t>
             </a:r>
             <a:endParaRPr lang="en-US" dirty="0"/>
           </a:p>
@@ -6739,70 +5672,20 @@
             <a:spLocks noGrp="1"/>
           </p:cNvSpPr>
           <p:nvPr>
-            <p:ph sz="half" idx="1"/>
-          </p:nvPr>
-        </p:nvSpPr>
-        <p:spPr>
-          <a:xfrm>
-            <a:off x="457200" y="1600201"/>
-            <a:ext cx="8153400" cy="1524000"/>
-          </a:xfrm>
-        </p:spPr>
-        <p:txBody>
-          <a:bodyPr/>
-          <a:lstStyle/>
-          <a:p>
-            <a:r>
-              <a:rPr lang="en-US" dirty="0" smtClean="0"/>
-              <a:t>Simple use and easy to understand style</a:t>
-            </a:r>
-          </a:p>
-          <a:p>
-            <a:r>
-              <a:rPr lang="en-US" dirty="0" smtClean="0"/>
-              <a:t>Requirements well established and unlikely to be significantly changed</a:t>
-            </a:r>
+            <p:ph idx="1"/>
+          </p:nvPr>
+        </p:nvSpPr>
+        <p:spPr/>
+        <p:txBody>
+          <a:bodyPr>
+            <a:normAutofit/>
+          </a:bodyPr>
+          <a:lstStyle/>
+          <a:p>
             <a:endParaRPr lang="en-US" dirty="0"/>
           </a:p>
         </p:txBody>
       </p:sp>
-      <p:pic>
-        <p:nvPicPr>
-          <p:cNvPr id="5" name="Content Placeholder 4" descr="Macintosh HD:Users:watdahieu:Desktop:Waterfall1.png"/>
-          <p:cNvPicPr>
-            <a:picLocks noGrp="1"/>
-          </p:cNvPicPr>
-          <p:nvPr>
-            <p:ph sz="half" idx="2"/>
-          </p:nvPr>
-        </p:nvPicPr>
-        <p:blipFill>
-          <a:blip r:embed="rId2" cstate="print">
-            <a:extLst>
-              <a:ext uri="{28A0092B-C50C-407E-A947-70E740481C1C}">
-                <a14:useLocalDpi xmlns="" xmlns:a14="http://schemas.microsoft.com/office/drawing/2010/main" val="0"/>
-              </a:ext>
-            </a:extLst>
-          </a:blip>
-          <a:srcRect/>
-          <a:stretch>
-            <a:fillRect/>
-          </a:stretch>
-        </p:blipFill>
-        <p:spPr bwMode="auto">
-          <a:xfrm>
-            <a:off x="1447800" y="3200400"/>
-            <a:ext cx="6629400" cy="2895600"/>
-          </a:xfrm>
-          <a:prstGeom prst="rect">
-            <a:avLst/>
-          </a:prstGeom>
-          <a:noFill/>
-          <a:ln>
-            <a:noFill/>
-          </a:ln>
-        </p:spPr>
-      </p:pic>
     </p:spTree>
   </p:cSld>
   <p:clrMapOvr>

</xml_diff>

<commit_message>
Added Hypothetical slides for everyone
</commit_message>
<xml_diff>
--- a/A Team Documents/Final presentation.pptx
+++ b/A Team Documents/Final presentation.pptx
@@ -5,10 +5,10 @@
     <p:sldMasterId id="2147483780" r:id="rId1"/>
   </p:sldMasterIdLst>
   <p:notesMasterIdLst>
-    <p:notesMasterId r:id="rId25"/>
+    <p:notesMasterId r:id="rId26"/>
   </p:notesMasterIdLst>
   <p:handoutMasterIdLst>
-    <p:handoutMasterId r:id="rId26"/>
+    <p:handoutMasterId r:id="rId27"/>
   </p:handoutMasterIdLst>
   <p:sldIdLst>
     <p:sldId id="338" r:id="rId2"/>
@@ -30,10 +30,11 @@
     <p:sldId id="339" r:id="rId18"/>
     <p:sldId id="337" r:id="rId19"/>
     <p:sldId id="315" r:id="rId20"/>
-    <p:sldId id="330" r:id="rId21"/>
+    <p:sldId id="344" r:id="rId21"/>
     <p:sldId id="318" r:id="rId22"/>
-    <p:sldId id="324" r:id="rId23"/>
-    <p:sldId id="295" r:id="rId24"/>
+    <p:sldId id="345" r:id="rId23"/>
+    <p:sldId id="324" r:id="rId24"/>
+    <p:sldId id="295" r:id="rId25"/>
   </p:sldIdLst>
   <p:sldSz cx="9144000" cy="6858000" type="screen4x3"/>
   <p:notesSz cx="6858000" cy="9144000"/>
@@ -218,7 +219,7 @@
             <a:fld id="{59E2BC62-7E84-44FB-9A81-3B8AD9AE521B}" type="datetimeFigureOut">
               <a:rPr lang="en-US" smtClean="0"/>
               <a:pPr/>
-              <a:t>5/5/2015</a:t>
+              <a:t>5/6/2015</a:t>
             </a:fld>
             <a:endParaRPr lang="en-US"/>
           </a:p>
@@ -294,7 +295,7 @@
     </p:spTree>
     <p:extLst>
       <p:ext uri="{BB962C8B-B14F-4D97-AF65-F5344CB8AC3E}">
-        <p14:creationId xmlns:p14="http://schemas.microsoft.com/office/powerpoint/2010/main" xmlns="" val="2856711207"/>
+        <p14:creationId xmlns:p14="http://schemas.microsoft.com/office/powerpoint/2010/main" val="2856711207"/>
       </p:ext>
     </p:extLst>
   </p:cSld>
@@ -385,7 +386,7 @@
             <a:fld id="{AC4D07E4-89AF-44D2-9F2F-5F6D2623599A}" type="datetimeFigureOut">
               <a:rPr lang="en-US" smtClean="0"/>
               <a:pPr/>
-              <a:t>5/5/2015</a:t>
+              <a:t>5/6/2015</a:t>
             </a:fld>
             <a:endParaRPr lang="en-US"/>
           </a:p>
@@ -556,7 +557,7 @@
     </p:spTree>
     <p:extLst>
       <p:ext uri="{BB962C8B-B14F-4D97-AF65-F5344CB8AC3E}">
-        <p14:creationId xmlns:p14="http://schemas.microsoft.com/office/powerpoint/2010/main" xmlns="" val="3571335044"/>
+        <p14:creationId xmlns:p14="http://schemas.microsoft.com/office/powerpoint/2010/main" val="3571335044"/>
       </p:ext>
     </p:extLst>
   </p:cSld>
@@ -1587,7 +1588,7 @@
             <a:fld id="{461E6A8B-52D2-4FB9-BB2D-A053F589DABE}" type="datetimeFigureOut">
               <a:rPr lang="en-US" smtClean="0"/>
               <a:pPr/>
-              <a:t>5/5/2015</a:t>
+              <a:t>5/6/2015</a:t>
             </a:fld>
             <a:endParaRPr lang="en-US" dirty="0"/>
           </a:p>
@@ -1754,7 +1755,7 @@
             <a:fld id="{461E6A8B-52D2-4FB9-BB2D-A053F589DABE}" type="datetimeFigureOut">
               <a:rPr lang="en-US" smtClean="0"/>
               <a:pPr/>
-              <a:t>5/5/2015</a:t>
+              <a:t>5/6/2015</a:t>
             </a:fld>
             <a:endParaRPr lang="en-US"/>
           </a:p>
@@ -1931,7 +1932,7 @@
             <a:fld id="{461E6A8B-52D2-4FB9-BB2D-A053F589DABE}" type="datetimeFigureOut">
               <a:rPr lang="en-US" smtClean="0"/>
               <a:pPr/>
-              <a:t>5/5/2015</a:t>
+              <a:t>5/6/2015</a:t>
             </a:fld>
             <a:endParaRPr lang="en-US"/>
           </a:p>
@@ -2377,7 +2378,7 @@
             <a:fld id="{461E6A8B-52D2-4FB9-BB2D-A053F589DABE}" type="datetimeFigureOut">
               <a:rPr lang="en-US" smtClean="0"/>
               <a:pPr/>
-              <a:t>5/5/2015</a:t>
+              <a:t>5/6/2015</a:t>
             </a:fld>
             <a:endParaRPr lang="en-US"/>
           </a:p>
@@ -3117,7 +3118,7 @@
             <a:fld id="{461E6A8B-52D2-4FB9-BB2D-A053F589DABE}" type="datetimeFigureOut">
               <a:rPr lang="en-US" smtClean="0"/>
               <a:pPr/>
-              <a:t>5/5/2015</a:t>
+              <a:t>5/6/2015</a:t>
             </a:fld>
             <a:endParaRPr lang="en-US"/>
           </a:p>
@@ -3360,7 +3361,7 @@
             <a:fld id="{461E6A8B-52D2-4FB9-BB2D-A053F589DABE}" type="datetimeFigureOut">
               <a:rPr lang="en-US" smtClean="0"/>
               <a:pPr/>
-              <a:t>5/5/2015</a:t>
+              <a:t>5/6/2015</a:t>
             </a:fld>
             <a:endParaRPr lang="en-US"/>
           </a:p>
@@ -3634,7 +3635,7 @@
             <a:fld id="{461E6A8B-52D2-4FB9-BB2D-A053F589DABE}" type="datetimeFigureOut">
               <a:rPr lang="en-US" smtClean="0"/>
               <a:pPr/>
-              <a:t>5/5/2015</a:t>
+              <a:t>5/6/2015</a:t>
             </a:fld>
             <a:endParaRPr lang="en-US"/>
           </a:p>
@@ -3884,7 +3885,7 @@
             <a:fld id="{461E6A8B-52D2-4FB9-BB2D-A053F589DABE}" type="datetimeFigureOut">
               <a:rPr lang="en-US" smtClean="0"/>
               <a:pPr/>
-              <a:t>5/5/2015</a:t>
+              <a:t>5/6/2015</a:t>
             </a:fld>
             <a:endParaRPr lang="en-US"/>
           </a:p>
@@ -4112,7 +4113,7 @@
             <a:fld id="{461E6A8B-52D2-4FB9-BB2D-A053F589DABE}" type="datetimeFigureOut">
               <a:rPr lang="en-US" smtClean="0"/>
               <a:pPr/>
-              <a:t>5/5/2015</a:t>
+              <a:t>5/6/2015</a:t>
             </a:fld>
             <a:endParaRPr lang="en-US"/>
           </a:p>
@@ -4629,14 +4630,6 @@
               </a:rPr>
               <a:t>Final Presentation</a:t>
             </a:r>
-            <a:endParaRPr lang="en-US" sz="2800" b="1" dirty="0" smtClean="0">
-              <a:solidFill>
-                <a:schemeClr val="tx1">
-                  <a:lumMod val="65000"/>
-                  <a:lumOff val="35000"/>
-                </a:schemeClr>
-              </a:solidFill>
-            </a:endParaRPr>
           </a:p>
           <a:p>
             <a:r>
@@ -4648,18 +4641,7 @@
                   </a:schemeClr>
                 </a:solidFill>
               </a:rPr>
-              <a:t>May 6, </a:t>
-            </a:r>
-            <a:r>
-              <a:rPr lang="en-US" sz="2800" b="1" dirty="0" smtClean="0">
-                <a:solidFill>
-                  <a:schemeClr val="tx1">
-                    <a:lumMod val="65000"/>
-                    <a:lumOff val="35000"/>
-                  </a:schemeClr>
-                </a:solidFill>
-              </a:rPr>
-              <a:t>2015</a:t>
+              <a:t>May 6, 2015</a:t>
             </a:r>
             <a:endParaRPr lang="en-US" sz="2800" b="1" dirty="0">
               <a:solidFill>
@@ -5627,10 +5609,6 @@
               <a:rPr lang="en-US" dirty="0" smtClean="0"/>
               <a:t>Test Report – Satisfied </a:t>
             </a:r>
-            <a:r>
-              <a:rPr lang="en-US" dirty="0" smtClean="0"/>
-              <a:t/>
-            </a:r>
             <a:br>
               <a:rPr lang="en-US" dirty="0" smtClean="0"/>
             </a:br>
@@ -5968,20 +5946,12 @@
               <a:rPr lang="en-US" dirty="0" smtClean="0"/>
               <a:t>Test Report – Satisfied </a:t>
             </a:r>
-            <a:r>
-              <a:rPr lang="en-US" dirty="0" smtClean="0"/>
-              <a:t/>
-            </a:r>
             <a:br>
               <a:rPr lang="en-US" dirty="0" smtClean="0"/>
             </a:br>
             <a:r>
               <a:rPr lang="en-US" dirty="0" smtClean="0"/>
-              <a:t>Requirements </a:t>
-            </a:r>
-            <a:r>
-              <a:rPr lang="en-US" dirty="0" smtClean="0"/>
-              <a:t>Cont’d</a:t>
+              <a:t>Requirements Cont’d</a:t>
             </a:r>
             <a:endParaRPr lang="en-US" dirty="0"/>
           </a:p>
@@ -6301,10 +6271,6 @@
             <a:r>
               <a:rPr lang="en-US" dirty="0" smtClean="0"/>
               <a:t>Test Report – Known </a:t>
-            </a:r>
-            <a:r>
-              <a:rPr lang="en-US" dirty="0" smtClean="0"/>
-              <a:t/>
             </a:r>
             <a:br>
               <a:rPr lang="en-US" dirty="0" smtClean="0"/>
@@ -6642,7 +6608,7 @@
     </p:spTree>
     <p:extLst>
       <p:ext uri="{BB962C8B-B14F-4D97-AF65-F5344CB8AC3E}">
-        <p14:creationId xmlns:p14="http://schemas.microsoft.com/office/powerpoint/2010/main" xmlns="" val="2037226595"/>
+        <p14:creationId xmlns:p14="http://schemas.microsoft.com/office/powerpoint/2010/main" val="2037226595"/>
       </p:ext>
     </p:extLst>
   </p:cSld>
@@ -6695,15 +6661,7 @@
           <a:p>
             <a:r>
               <a:rPr lang="en-US" dirty="0" smtClean="0"/>
-              <a:t>Deviations – </a:t>
-            </a:r>
-            <a:r>
-              <a:rPr lang="en-US" dirty="0" smtClean="0"/>
-              <a:t>Unsatisfied </a:t>
-            </a:r>
-            <a:r>
-              <a:rPr lang="en-US" dirty="0" smtClean="0"/>
-              <a:t/>
+              <a:t>Deviations – Unsatisfied </a:t>
             </a:r>
             <a:br>
               <a:rPr lang="en-US" dirty="0" smtClean="0"/>
@@ -6775,31 +6733,14 @@
           <a:p>
             <a:r>
               <a:rPr lang="en-US" dirty="0" smtClean="0"/>
-              <a:t>Microsoft </a:t>
-            </a:r>
+              <a:t>Microsoft Excel is required &amp; table lacks the “frame number”</a:t>
+            </a:r>
+          </a:p>
+          <a:p>
             <a:r>
               <a:rPr lang="en-US" dirty="0" smtClean="0"/>
-              <a:t>Excel is </a:t>
-            </a:r>
-            <a:r>
-              <a:rPr lang="en-US" dirty="0" smtClean="0"/>
-              <a:t>required &amp; </a:t>
-            </a:r>
-            <a:r>
-              <a:rPr lang="en-US" dirty="0" smtClean="0"/>
-              <a:t>table lacks the “frame number”</a:t>
-            </a:r>
-          </a:p>
-          <a:p>
-            <a:r>
-              <a:rPr lang="en-US" dirty="0" smtClean="0"/>
-              <a:t>Fine-tuning results consists of adjusting black/white calibration </a:t>
-            </a:r>
-            <a:r>
-              <a:rPr lang="en-US" dirty="0" smtClean="0"/>
-              <a:t>value</a:t>
-            </a:r>
-            <a:endParaRPr lang="en-US" dirty="0" smtClean="0"/>
+              <a:t>Fine-tuning results consists of adjusting black/white calibration value</a:t>
+            </a:r>
           </a:p>
         </p:txBody>
       </p:sp>
@@ -6916,15 +6857,7 @@
           <a:p>
             <a:r>
               <a:rPr lang="en-US" dirty="0" smtClean="0"/>
-              <a:t>Deviations</a:t>
-            </a:r>
-            <a:r>
-              <a:rPr lang="en-US" dirty="0" smtClean="0"/>
-              <a:t> – </a:t>
-            </a:r>
-            <a:r>
-              <a:rPr lang="en-US" dirty="0" smtClean="0"/>
-              <a:t>Plan</a:t>
+              <a:t>Deviations – Plan</a:t>
             </a:r>
             <a:endParaRPr lang="en-US" dirty="0"/>
           </a:p>
@@ -6952,15 +6885,7 @@
           <a:p>
             <a:r>
               <a:rPr lang="en-US" dirty="0" smtClean="0"/>
-              <a:t>“Requirements </a:t>
-            </a:r>
-            <a:r>
-              <a:rPr lang="en-US" dirty="0" smtClean="0"/>
-              <a:t>well </a:t>
-            </a:r>
-            <a:r>
-              <a:rPr lang="en-US" dirty="0" smtClean="0"/>
-              <a:t>established” (or so we thought)</a:t>
+              <a:t>“Requirements well established” (or so we thought)</a:t>
             </a:r>
           </a:p>
           <a:p>
@@ -6997,7 +6922,7 @@
           <a:blip r:embed="rId2" cstate="print">
             <a:extLst>
               <a:ext uri="{28A0092B-C50C-407E-A947-70E740481C1C}">
-                <a14:useLocalDpi xmlns="" xmlns:a14="http://schemas.microsoft.com/office/drawing/2010/main" val="0"/>
+                <a14:useLocalDpi xmlns:a14="http://schemas.microsoft.com/office/drawing/2010/main" val="0"/>
               </a:ext>
             </a:extLst>
           </a:blip>
@@ -7240,25 +7165,61 @@
           <a:p>
             <a:r>
               <a:rPr lang="en-US" dirty="0" smtClean="0"/>
-              <a:t>What if we had more time?</a:t>
-            </a:r>
-          </a:p>
-          <a:p>
+              <a:t>What if we had more time</a:t>
+            </a:r>
+            <a:r>
+              <a:rPr lang="en-US" dirty="0" smtClean="0"/>
+              <a:t>?</a:t>
+            </a:r>
+          </a:p>
+          <a:p>
+            <a:pPr lvl="1"/>
+            <a:r>
+              <a:rPr lang="en-US" dirty="0" smtClean="0"/>
+              <a:t>Test the project more thoroughly</a:t>
+            </a:r>
             <a:endParaRPr lang="en-US" dirty="0" smtClean="0"/>
           </a:p>
           <a:p>
             <a:r>
               <a:rPr lang="en-US" dirty="0" smtClean="0"/>
-              <a:t>What if we could start over?</a:t>
-            </a:r>
-          </a:p>
-          <a:p>
+              <a:t>What if we could start over</a:t>
+            </a:r>
+            <a:r>
+              <a:rPr lang="en-US" dirty="0" smtClean="0"/>
+              <a:t>?</a:t>
+            </a:r>
+          </a:p>
+          <a:p>
+            <a:pPr lvl="1"/>
+            <a:r>
+              <a:rPr lang="en-US" dirty="0" smtClean="0"/>
+              <a:t>Begin testing earlier</a:t>
+            </a:r>
             <a:endParaRPr lang="en-US" dirty="0" smtClean="0"/>
           </a:p>
           <a:p>
             <a:r>
               <a:rPr lang="en-US" dirty="0" smtClean="0"/>
-              <a:t>What we learned</a:t>
+              <a:t>What </a:t>
+            </a:r>
+            <a:r>
+              <a:rPr lang="en-US" dirty="0" smtClean="0"/>
+              <a:t>I learned</a:t>
+            </a:r>
+          </a:p>
+          <a:p>
+            <a:pPr lvl="1"/>
+            <a:r>
+              <a:rPr lang="en-US" dirty="0" smtClean="0"/>
+              <a:t>How teams work in real world projects</a:t>
+            </a:r>
+          </a:p>
+          <a:p>
+            <a:pPr lvl="1"/>
+            <a:r>
+              <a:rPr lang="en-US" dirty="0" smtClean="0"/>
+              <a:t>Documentation &amp; testing</a:t>
             </a:r>
             <a:endParaRPr lang="en-US" dirty="0"/>
           </a:p>
@@ -7331,7 +7292,9 @@
         </p:nvSpPr>
         <p:spPr/>
         <p:txBody>
-          <a:bodyPr/>
+          <a:bodyPr>
+            <a:normAutofit lnSpcReduction="10000"/>
+          </a:bodyPr>
           <a:lstStyle/>
           <a:p>
             <a:r>
@@ -7342,44 +7305,46 @@
           <a:p>
             <a:r>
               <a:rPr lang="en-US" dirty="0" smtClean="0"/>
-              <a:t>System </a:t>
-            </a:r>
+              <a:t>Problem Description</a:t>
+            </a:r>
+            <a:endParaRPr lang="en-US" dirty="0" smtClean="0"/>
+          </a:p>
+          <a:p>
             <a:r>
               <a:rPr lang="en-US" dirty="0" smtClean="0"/>
-              <a:t>Architecture/</a:t>
-            </a:r>
-            <a:r>
-              <a:rPr lang="en-US" dirty="0" smtClean="0"/>
-              <a:t>Design Diagrams</a:t>
-            </a:r>
-            <a:endParaRPr lang="en-US" dirty="0" smtClean="0"/>
+              <a:t>System Architecture/Design Diagrams</a:t>
+            </a:r>
           </a:p>
           <a:p>
             <a:r>
               <a:rPr lang="en-US" dirty="0" smtClean="0"/>
               <a:t>Demo</a:t>
             </a:r>
-            <a:endParaRPr lang="en-US" dirty="0" smtClean="0"/>
           </a:p>
           <a:p>
             <a:r>
               <a:rPr lang="en-US" dirty="0" smtClean="0"/>
               <a:t>Test Report</a:t>
             </a:r>
-            <a:endParaRPr lang="en-US" dirty="0" smtClean="0"/>
           </a:p>
           <a:p>
             <a:r>
               <a:rPr lang="en-US" dirty="0" smtClean="0"/>
               <a:t>Deployment Issues</a:t>
             </a:r>
+          </a:p>
+          <a:p>
+            <a:r>
+              <a:rPr lang="en-US" dirty="0" smtClean="0"/>
+              <a:t>Deviations</a:t>
+            </a:r>
+          </a:p>
+          <a:p>
+            <a:r>
+              <a:rPr lang="en-US" dirty="0" smtClean="0"/>
+              <a:t>Conclusion</a:t>
+            </a:r>
             <a:endParaRPr lang="en-US" dirty="0" smtClean="0"/>
-          </a:p>
-          <a:p>
-            <a:r>
-              <a:rPr lang="en-US" dirty="0" smtClean="0"/>
-              <a:t>Work-to-date and Future Work</a:t>
-            </a:r>
           </a:p>
           <a:p>
             <a:endParaRPr lang="en-US" dirty="0" smtClean="0"/>
@@ -7467,22 +7432,17 @@
             <p:ph type="title"/>
           </p:nvPr>
         </p:nvSpPr>
-        <p:spPr>
-          <a:xfrm>
-            <a:off x="457200" y="304800"/>
-            <a:ext cx="8229600" cy="1143000"/>
-          </a:xfrm>
-        </p:spPr>
+        <p:spPr/>
         <p:txBody>
           <a:bodyPr/>
           <a:lstStyle/>
           <a:p>
             <a:r>
-              <a:rPr lang="en-US" dirty="0" smtClean="0"/>
+              <a:rPr lang="en-US" dirty="0"/>
               <a:t>Hypothetical - </a:t>
             </a:r>
             <a:r>
-              <a:rPr lang="en-US" dirty="0" err="1" smtClean="0"/>
+              <a:rPr lang="en-US" dirty="0" err="1"/>
               <a:t>Romando</a:t>
             </a:r>
             <a:endParaRPr lang="en-US" dirty="0"/>
@@ -7491,159 +7451,100 @@
       </p:sp>
       <p:sp>
         <p:nvSpPr>
-          <p:cNvPr id="5" name="TextBox 4"/>
-          <p:cNvSpPr txBox="1"/>
-          <p:nvPr/>
-        </p:nvSpPr>
-        <p:spPr>
-          <a:xfrm>
-            <a:off x="685800" y="1447800"/>
-            <a:ext cx="7543800" cy="5047536"/>
-          </a:xfrm>
-          <a:prstGeom prst="rect">
-            <a:avLst/>
-          </a:prstGeom>
-          <a:noFill/>
-        </p:spPr>
-        <p:txBody>
-          <a:bodyPr wrap="square" rtlCol="0">
-            <a:spAutoFit/>
+          <p:cNvPr id="3" name="Content Placeholder 2"/>
+          <p:cNvSpPr>
+            <a:spLocks noGrp="1"/>
+          </p:cNvSpPr>
+          <p:nvPr>
+            <p:ph idx="1"/>
+          </p:nvPr>
+        </p:nvSpPr>
+        <p:spPr/>
+        <p:txBody>
+          <a:bodyPr>
+            <a:normAutofit lnSpcReduction="10000"/>
           </a:bodyPr>
           <a:lstStyle/>
           <a:p>
-            <a:pPr>
-              <a:buFont typeface="Arial" pitchFamily="34" charset="0"/>
-              <a:buChar char="•"/>
-            </a:pPr>
-            <a:r>
-              <a:rPr lang="en-US" sz="2800" dirty="0" smtClean="0">
-                <a:cs typeface="Times New Roman" pitchFamily="18" charset="0"/>
-              </a:rPr>
-              <a:t> What if I had more time?</a:t>
-            </a:r>
-          </a:p>
-          <a:p>
-            <a:pPr lvl="1">
-              <a:buFont typeface="Arial" pitchFamily="34" charset="0"/>
-              <a:buChar char="•"/>
-            </a:pPr>
-            <a:r>
-              <a:rPr lang="en-US" sz="2400" dirty="0" smtClean="0">
-                <a:cs typeface="Times New Roman" pitchFamily="18" charset="0"/>
-              </a:rPr>
-              <a:t> Perform more test</a:t>
+            <a:r>
+              <a:rPr lang="en-US" dirty="0" smtClean="0"/>
+              <a:t>What if we had more time</a:t>
+            </a:r>
+            <a:r>
+              <a:rPr lang="en-US" dirty="0" smtClean="0"/>
+              <a:t>?</a:t>
             </a:r>
           </a:p>
           <a:p>
             <a:pPr lvl="1"/>
-            <a:endParaRPr lang="en-US" sz="2400" dirty="0" smtClean="0">
-              <a:cs typeface="Times New Roman" pitchFamily="18" charset="0"/>
-            </a:endParaRPr>
-          </a:p>
-          <a:p>
-            <a:pPr>
-              <a:buFont typeface="Arial" pitchFamily="34" charset="0"/>
-              <a:buChar char="•"/>
-            </a:pPr>
-            <a:r>
-              <a:rPr lang="en-US" sz="2800" dirty="0" smtClean="0">
-                <a:cs typeface="Times New Roman" pitchFamily="18" charset="0"/>
-              </a:rPr>
-              <a:t> What if I could start over?</a:t>
-            </a:r>
-          </a:p>
-          <a:p>
-            <a:pPr lvl="1">
-              <a:buFont typeface="Arial" pitchFamily="34" charset="0"/>
-              <a:buChar char="•"/>
-            </a:pPr>
-            <a:r>
-              <a:rPr lang="en-US" sz="2400" dirty="0" smtClean="0">
-                <a:cs typeface="Times New Roman" pitchFamily="18" charset="0"/>
-              </a:rPr>
-              <a:t> Communicate more with clients</a:t>
-            </a:r>
-          </a:p>
-          <a:p>
-            <a:pPr lvl="1">
-              <a:buFont typeface="Arial" pitchFamily="34" charset="0"/>
-              <a:buChar char="•"/>
-            </a:pPr>
-            <a:r>
-              <a:rPr lang="en-US" sz="2400" dirty="0" smtClean="0">
-                <a:cs typeface="Times New Roman" pitchFamily="18" charset="0"/>
-              </a:rPr>
+            <a:r>
+              <a:rPr lang="en-US" dirty="0"/>
+              <a:t>Perform more testing</a:t>
+            </a:r>
+          </a:p>
+          <a:p>
+            <a:r>
+              <a:rPr lang="en-US" dirty="0" smtClean="0"/>
+              <a:t>What </a:t>
+            </a:r>
+            <a:r>
+              <a:rPr lang="en-US" dirty="0" smtClean="0"/>
+              <a:t>if we could start over</a:t>
+            </a:r>
+            <a:r>
+              <a:rPr lang="en-US" dirty="0" smtClean="0"/>
+              <a:t>?</a:t>
+            </a:r>
+          </a:p>
+          <a:p>
+            <a:pPr lvl="1"/>
+            <a:r>
+              <a:rPr lang="en-US" dirty="0"/>
+              <a:t>Communicate more with clients</a:t>
+            </a:r>
+          </a:p>
+          <a:p>
+            <a:pPr lvl="1"/>
+            <a:r>
+              <a:rPr lang="en-US" dirty="0"/>
               <a:t> Have necessary resources</a:t>
             </a:r>
           </a:p>
           <a:p>
+            <a:r>
+              <a:rPr lang="en-US" dirty="0" smtClean="0"/>
+              <a:t>What I learned</a:t>
+            </a:r>
+          </a:p>
+          <a:p>
             <a:pPr lvl="1"/>
-            <a:endParaRPr lang="en-US" sz="2400" dirty="0" smtClean="0">
-              <a:cs typeface="Times New Roman" pitchFamily="18" charset="0"/>
-            </a:endParaRPr>
-          </a:p>
-          <a:p>
-            <a:pPr>
-              <a:buFont typeface="Arial" pitchFamily="34" charset="0"/>
-              <a:buChar char="•"/>
-            </a:pPr>
-            <a:r>
-              <a:rPr lang="en-US" sz="2800" dirty="0" smtClean="0">
-                <a:cs typeface="Times New Roman" pitchFamily="18" charset="0"/>
-              </a:rPr>
-              <a:t>What I learned…</a:t>
-            </a:r>
-          </a:p>
-          <a:p>
-            <a:pPr lvl="1">
-              <a:buFont typeface="Arial" pitchFamily="34" charset="0"/>
-              <a:buChar char="•"/>
-            </a:pPr>
-            <a:r>
-              <a:rPr lang="en-US" sz="2400" dirty="0" smtClean="0">
-                <a:cs typeface="Times New Roman" pitchFamily="18" charset="0"/>
-              </a:rPr>
-              <a:t> Link components together using COM</a:t>
-            </a:r>
-          </a:p>
-          <a:p>
-            <a:pPr lvl="1">
-              <a:buFont typeface="Arial" pitchFamily="34" charset="0"/>
-              <a:buChar char="•"/>
-            </a:pPr>
-            <a:r>
-              <a:rPr lang="en-US" sz="2400" dirty="0" smtClean="0">
-                <a:cs typeface="Times New Roman" pitchFamily="18" charset="0"/>
-              </a:rPr>
+            <a:r>
+              <a:rPr lang="en-US" dirty="0"/>
+              <a:t>Link components together using COM</a:t>
+            </a:r>
+          </a:p>
+          <a:p>
+            <a:pPr lvl="1"/>
+            <a:r>
+              <a:rPr lang="en-US" dirty="0"/>
               <a:t> Importance of documentation/designs</a:t>
             </a:r>
           </a:p>
           <a:p>
-            <a:pPr lvl="1">
-              <a:buFont typeface="Arial" pitchFamily="34" charset="0"/>
-              <a:buChar char="•"/>
-            </a:pPr>
-            <a:r>
-              <a:rPr lang="en-US" sz="2400" dirty="0" smtClean="0">
-                <a:cs typeface="Times New Roman" pitchFamily="18" charset="0"/>
-              </a:rPr>
+            <a:pPr lvl="1"/>
+            <a:r>
+              <a:rPr lang="en-US" dirty="0"/>
               <a:t> Teamwork</a:t>
             </a:r>
           </a:p>
-          <a:p>
-            <a:pPr lvl="1"/>
-            <a:endParaRPr lang="en-US" dirty="0" smtClean="0">
-              <a:cs typeface="Times New Roman" pitchFamily="18" charset="0"/>
-            </a:endParaRPr>
-          </a:p>
-          <a:p>
-            <a:endParaRPr lang="en-US" sz="2800" b="1" dirty="0" smtClean="0">
-              <a:cs typeface="Times New Roman" pitchFamily="18" charset="0"/>
-            </a:endParaRPr>
-          </a:p>
         </p:txBody>
       </p:sp>
     </p:spTree>
+    <p:extLst>
+      <p:ext uri="{BB962C8B-B14F-4D97-AF65-F5344CB8AC3E}">
+        <p14:creationId xmlns:p14="http://schemas.microsoft.com/office/powerpoint/2010/main" val="2873693614"/>
+      </p:ext>
+    </p:extLst>
   </p:cSld>
   <p:clrMapOvr>
     <a:masterClrMapping/>
@@ -7816,7 +7717,11 @@
           <a:p>
             <a:r>
               <a:rPr lang="en-US" dirty="0" smtClean="0"/>
-              <a:t>Conclusion</a:t>
+              <a:t>Hypothetical – </a:t>
+            </a:r>
+            <a:r>
+              <a:rPr lang="en-US" dirty="0" err="1" smtClean="0"/>
+              <a:t>Hieu</a:t>
             </a:r>
             <a:endParaRPr lang="en-US" dirty="0"/>
           </a:p>
@@ -7824,96 +7729,72 @@
       </p:sp>
       <p:sp>
         <p:nvSpPr>
-          <p:cNvPr id="6" name="Content Placeholder 5"/>
-          <p:cNvSpPr>
-            <a:spLocks noGrp="1"/>
-          </p:cNvSpPr>
-          <p:nvPr>
-            <p:ph sz="half" idx="1"/>
-          </p:nvPr>
-        </p:nvSpPr>
-        <p:spPr>
-          <a:xfrm>
-            <a:off x="457200" y="1600200"/>
-            <a:ext cx="8153400" cy="4525963"/>
-          </a:xfrm>
-        </p:spPr>
-        <p:txBody>
-          <a:bodyPr>
-            <a:normAutofit/>
-          </a:bodyPr>
+          <p:cNvPr id="3" name="Content Placeholder 2"/>
+          <p:cNvSpPr>
+            <a:spLocks noGrp="1"/>
+          </p:cNvSpPr>
+          <p:nvPr>
+            <p:ph idx="1"/>
+          </p:nvPr>
+        </p:nvSpPr>
+        <p:spPr/>
+        <p:txBody>
+          <a:bodyPr/>
           <a:lstStyle/>
           <a:p>
             <a:r>
-              <a:rPr lang="en-US" sz="3600" dirty="0" smtClean="0"/>
-              <a:t>Project is overall success</a:t>
+              <a:rPr lang="en-US" dirty="0" smtClean="0"/>
+              <a:t>What if we had more time?</a:t>
             </a:r>
           </a:p>
           <a:p>
             <a:pPr lvl="1"/>
             <a:r>
-              <a:rPr lang="en-US" sz="3600" dirty="0" smtClean="0"/>
-              <a:t>Almost all goals achieved</a:t>
+              <a:rPr lang="en-US" dirty="0" smtClean="0"/>
+              <a:t>Improve software performance time</a:t>
+            </a:r>
+          </a:p>
+          <a:p>
+            <a:r>
+              <a:rPr lang="en-US" dirty="0" smtClean="0"/>
+              <a:t>What if we could start over?</a:t>
             </a:r>
           </a:p>
           <a:p>
             <a:pPr lvl="1"/>
             <a:r>
-              <a:rPr lang="en-US" sz="3600" dirty="0" smtClean="0"/>
-              <a:t>Accurate results</a:t>
+              <a:rPr lang="en-US" dirty="0" smtClean="0"/>
+              <a:t>Better communication with client</a:t>
+            </a:r>
+            <a:endParaRPr lang="en-US" dirty="0" smtClean="0"/>
+          </a:p>
+          <a:p>
+            <a:r>
+              <a:rPr lang="en-US" dirty="0" smtClean="0"/>
+              <a:t>What I learned</a:t>
             </a:r>
           </a:p>
           <a:p>
             <a:pPr lvl="1"/>
             <a:r>
-              <a:rPr lang="en-US" sz="3600" dirty="0" smtClean="0"/>
-              <a:t>Highly automated (Little user interaction)</a:t>
+              <a:rPr lang="en-US" dirty="0" smtClean="0"/>
+              <a:t>Improved documentation</a:t>
             </a:r>
           </a:p>
           <a:p>
             <a:pPr lvl="1"/>
             <a:r>
-              <a:rPr lang="en-US" sz="3600" dirty="0" smtClean="0"/>
-              <a:t>Structured development process</a:t>
-            </a:r>
-            <a:endParaRPr lang="en-US" sz="3600" dirty="0"/>
-          </a:p>
-        </p:txBody>
-      </p:sp>
-      <p:sp>
-        <p:nvSpPr>
-          <p:cNvPr id="5" name="Content Placeholder 4"/>
-          <p:cNvSpPr>
-            <a:spLocks noGrp="1"/>
-          </p:cNvSpPr>
-          <p:nvPr>
-            <p:ph sz="half" idx="2"/>
-          </p:nvPr>
-        </p:nvSpPr>
-        <p:spPr/>
-        <p:txBody>
-          <a:bodyPr>
-            <a:normAutofit/>
-          </a:bodyPr>
-          <a:lstStyle/>
-          <a:p>
-            <a:endParaRPr lang="en-US" sz="3600" dirty="0" smtClean="0"/>
-          </a:p>
-          <a:p>
+              <a:rPr lang="en-US" dirty="0" smtClean="0"/>
+              <a:t>Time management skills</a:t>
+            </a:r>
             <a:endParaRPr lang="en-US" dirty="0" smtClean="0"/>
-          </a:p>
-          <a:p>
-            <a:endParaRPr lang="en-US" dirty="0" smtClean="0"/>
-          </a:p>
-          <a:p>
-            <a:endParaRPr lang="en-US" dirty="0"/>
           </a:p>
         </p:txBody>
       </p:sp>
     </p:spTree>
     <p:extLst>
       <p:ext uri="{BB962C8B-B14F-4D97-AF65-F5344CB8AC3E}">
-        <p14:creationId xmlns:p14="http://schemas.microsoft.com/office/powerpoint/2010/main" xmlns="" val="501749378"/>
+        <p14:creationId xmlns:p14="http://schemas.microsoft.com/office/powerpoint/2010/main" val="2827139130"/>
       </p:ext>
     </p:extLst>
   </p:cSld>
@@ -7931,6 +7812,162 @@
 </file>
 
 <file path=ppt/slides/slide23.xml><?xml version="1.0" encoding="utf-8"?>
+<p:sld xmlns:a="http://schemas.openxmlformats.org/drawingml/2006/main" xmlns:r="http://schemas.openxmlformats.org/officeDocument/2006/relationships" xmlns:p="http://schemas.openxmlformats.org/presentationml/2006/main">
+  <p:cSld>
+    <p:spTree>
+      <p:nvGrpSpPr>
+        <p:cNvPr id="1" name=""/>
+        <p:cNvGrpSpPr/>
+        <p:nvPr/>
+      </p:nvGrpSpPr>
+      <p:grpSpPr>
+        <a:xfrm>
+          <a:off x="0" y="0"/>
+          <a:ext cx="0" cy="0"/>
+          <a:chOff x="0" y="0"/>
+          <a:chExt cx="0" cy="0"/>
+        </a:xfrm>
+      </p:grpSpPr>
+      <p:sp>
+        <p:nvSpPr>
+          <p:cNvPr id="2" name="Title 1"/>
+          <p:cNvSpPr>
+            <a:spLocks noGrp="1"/>
+          </p:cNvSpPr>
+          <p:nvPr>
+            <p:ph type="title"/>
+          </p:nvPr>
+        </p:nvSpPr>
+        <p:spPr/>
+        <p:txBody>
+          <a:bodyPr/>
+          <a:lstStyle/>
+          <a:p>
+            <a:r>
+              <a:rPr lang="en-US" dirty="0" smtClean="0"/>
+              <a:t>Conclusion</a:t>
+            </a:r>
+            <a:endParaRPr lang="en-US" dirty="0"/>
+          </a:p>
+        </p:txBody>
+      </p:sp>
+      <p:sp>
+        <p:nvSpPr>
+          <p:cNvPr id="6" name="Content Placeholder 5"/>
+          <p:cNvSpPr>
+            <a:spLocks noGrp="1"/>
+          </p:cNvSpPr>
+          <p:nvPr>
+            <p:ph sz="half" idx="1"/>
+          </p:nvPr>
+        </p:nvSpPr>
+        <p:spPr>
+          <a:xfrm>
+            <a:off x="457200" y="1600200"/>
+            <a:ext cx="8153400" cy="4525963"/>
+          </a:xfrm>
+        </p:spPr>
+        <p:txBody>
+          <a:bodyPr>
+            <a:normAutofit/>
+          </a:bodyPr>
+          <a:lstStyle/>
+          <a:p>
+            <a:r>
+              <a:rPr lang="en-US" sz="3600" dirty="0" smtClean="0"/>
+              <a:t>Project is overall success</a:t>
+            </a:r>
+          </a:p>
+          <a:p>
+            <a:pPr lvl="1"/>
+            <a:r>
+              <a:rPr lang="en-US" sz="3600" dirty="0" smtClean="0"/>
+              <a:t>Almost </a:t>
+            </a:r>
+            <a:r>
+              <a:rPr lang="en-US" sz="3600" dirty="0" smtClean="0"/>
+              <a:t>every goal </a:t>
+            </a:r>
+            <a:r>
+              <a:rPr lang="en-US" sz="3600" dirty="0" smtClean="0"/>
+              <a:t>achieved</a:t>
+            </a:r>
+          </a:p>
+          <a:p>
+            <a:pPr lvl="1"/>
+            <a:r>
+              <a:rPr lang="en-US" sz="3600" dirty="0" smtClean="0"/>
+              <a:t>Accurate results</a:t>
+            </a:r>
+          </a:p>
+          <a:p>
+            <a:pPr lvl="1"/>
+            <a:r>
+              <a:rPr lang="en-US" sz="3600" dirty="0" smtClean="0"/>
+              <a:t>Highly automated (Little user interaction)</a:t>
+            </a:r>
+          </a:p>
+          <a:p>
+            <a:pPr lvl="1"/>
+            <a:r>
+              <a:rPr lang="en-US" sz="3600" dirty="0" smtClean="0"/>
+              <a:t>Structured development process</a:t>
+            </a:r>
+            <a:endParaRPr lang="en-US" sz="3600" dirty="0"/>
+          </a:p>
+        </p:txBody>
+      </p:sp>
+      <p:sp>
+        <p:nvSpPr>
+          <p:cNvPr id="5" name="Content Placeholder 4"/>
+          <p:cNvSpPr>
+            <a:spLocks noGrp="1"/>
+          </p:cNvSpPr>
+          <p:nvPr>
+            <p:ph sz="half" idx="2"/>
+          </p:nvPr>
+        </p:nvSpPr>
+        <p:spPr/>
+        <p:txBody>
+          <a:bodyPr>
+            <a:normAutofit/>
+          </a:bodyPr>
+          <a:lstStyle/>
+          <a:p>
+            <a:endParaRPr lang="en-US" sz="3600" dirty="0" smtClean="0"/>
+          </a:p>
+          <a:p>
+            <a:endParaRPr lang="en-US" dirty="0" smtClean="0"/>
+          </a:p>
+          <a:p>
+            <a:endParaRPr lang="en-US" dirty="0" smtClean="0"/>
+          </a:p>
+          <a:p>
+            <a:endParaRPr lang="en-US" dirty="0"/>
+          </a:p>
+        </p:txBody>
+      </p:sp>
+    </p:spTree>
+    <p:extLst>
+      <p:ext uri="{BB962C8B-B14F-4D97-AF65-F5344CB8AC3E}">
+        <p14:creationId xmlns:p14="http://schemas.microsoft.com/office/powerpoint/2010/main" val="501749378"/>
+      </p:ext>
+    </p:extLst>
+  </p:cSld>
+  <p:clrMapOvr>
+    <a:masterClrMapping/>
+  </p:clrMapOvr>
+  <p:timing>
+    <p:tnLst>
+      <p:par>
+        <p:cTn id="1" dur="indefinite" restart="never" nodeType="tmRoot"/>
+      </p:par>
+    </p:tnLst>
+  </p:timing>
+</p:sld>
+</file>
+
+<file path=ppt/slides/slide24.xml><?xml version="1.0" encoding="utf-8"?>
 <p:sld xmlns:a="http://schemas.openxmlformats.org/drawingml/2006/main" xmlns:r="http://schemas.openxmlformats.org/officeDocument/2006/relationships" xmlns:p="http://schemas.openxmlformats.org/presentationml/2006/main">
   <p:cSld>
     <p:spTree>
@@ -8210,14 +8247,28 @@
           </a:p>
           <a:p>
             <a:r>
+              <a:rPr lang="en-US" dirty="0"/>
+              <a:t>Slight disturbances move the droplet</a:t>
+            </a:r>
+          </a:p>
+          <a:p>
+            <a:r>
               <a:rPr lang="en-US" dirty="0" smtClean="0"/>
-              <a:t>With little friction between vapor and surface, slight disturbances move the droplet</a:t>
-            </a:r>
-          </a:p>
-          <a:p>
+              <a:t>Ratchet </a:t>
+            </a:r>
             <a:r>
               <a:rPr lang="en-US" dirty="0" smtClean="0"/>
-              <a:t>Ratchet surface gives just the right disturbance to control the movement</a:t>
+              <a:t>surface gives just the right disturbance to control the </a:t>
+            </a:r>
+            <a:r>
+              <a:rPr lang="en-US" dirty="0" smtClean="0"/>
+              <a:t>movement</a:t>
+            </a:r>
+          </a:p>
+          <a:p>
+            <a:r>
+              <a:rPr lang="en-US" dirty="0" smtClean="0"/>
+              <a:t>Potential uses in micro-cooling</a:t>
             </a:r>
             <a:endParaRPr lang="en-US" dirty="0"/>
           </a:p>
@@ -8336,7 +8387,7 @@
           <a:p>
             <a:r>
               <a:rPr lang="en-US" dirty="0" smtClean="0"/>
-              <a:t>Our objective</a:t>
+              <a:t>Description of Problem</a:t>
             </a:r>
             <a:endParaRPr lang="en-US" dirty="0"/>
           </a:p>
@@ -8364,31 +8415,67 @@
           </a:bodyPr>
           <a:lstStyle/>
           <a:p>
-            <a:r>
-              <a:rPr lang="en-US" dirty="0" smtClean="0"/>
-              <a:t>Potential uses in micro-cooling</a:t>
-            </a:r>
-          </a:p>
-          <a:p>
-            <a:r>
-              <a:rPr lang="en-US" dirty="0" smtClean="0"/>
-              <a:t>Customers, Dr. Ok and Dr. </a:t>
-            </a:r>
-            <a:r>
-              <a:rPr lang="en-US" dirty="0" err="1" smtClean="0"/>
-              <a:t>Guo</a:t>
-            </a:r>
-            <a:r>
-              <a:rPr lang="en-US" dirty="0" smtClean="0"/>
-              <a:t>, require data on droplet kinetics</a:t>
-            </a:r>
-          </a:p>
-          <a:p>
-            <a:r>
-              <a:rPr lang="en-US" dirty="0" smtClean="0"/>
-              <a:t>Collect data from images taken through high-speed camera</a:t>
-            </a:r>
-            <a:endParaRPr lang="en-US" dirty="0"/>
+            <a:pPr lvl="0">
+              <a:defRPr/>
+            </a:pPr>
+            <a:r>
+              <a:rPr lang="en-US" sz="3000" dirty="0"/>
+              <a:t>Process droplet image</a:t>
+            </a:r>
+          </a:p>
+          <a:p>
+            <a:pPr lvl="0">
+              <a:defRPr/>
+            </a:pPr>
+            <a:r>
+              <a:rPr lang="en-US" sz="3000" dirty="0"/>
+              <a:t>Kinematics &amp; volume</a:t>
+            </a:r>
+          </a:p>
+          <a:p>
+            <a:pPr lvl="0">
+              <a:defRPr/>
+            </a:pPr>
+            <a:r>
+              <a:rPr lang="en-US" sz="3000" dirty="0"/>
+              <a:t>Calibration</a:t>
+            </a:r>
+          </a:p>
+          <a:p>
+            <a:pPr lvl="0">
+              <a:defRPr/>
+            </a:pPr>
+            <a:r>
+              <a:rPr lang="en-US" sz="3000" dirty="0"/>
+              <a:t>Pixel to real units</a:t>
+            </a:r>
+          </a:p>
+          <a:p>
+            <a:pPr lvl="0">
+              <a:defRPr/>
+            </a:pPr>
+            <a:r>
+              <a:rPr lang="en-US" sz="3000" dirty="0"/>
+              <a:t>Display results in Excel</a:t>
+            </a:r>
+          </a:p>
+          <a:p>
+            <a:pPr lvl="0">
+              <a:defRPr/>
+            </a:pPr>
+            <a:r>
+              <a:rPr lang="en-US" sz="3000" dirty="0"/>
+              <a:t>Visual data rep.</a:t>
+            </a:r>
+          </a:p>
+          <a:p>
+            <a:pPr lvl="0">
+              <a:defRPr/>
+            </a:pPr>
+            <a:r>
+              <a:rPr lang="en-US" sz="3000" dirty="0"/>
+              <a:t>Automation &amp; performance</a:t>
+            </a:r>
           </a:p>
         </p:txBody>
       </p:sp>
@@ -8832,7 +8919,7 @@
           <a:blip r:embed="rId2" cstate="print">
             <a:extLst>
               <a:ext uri="{28A0092B-C50C-407E-A947-70E740481C1C}">
-                <a14:useLocalDpi xmlns="" xmlns:a14="http://schemas.microsoft.com/office/drawing/2010/main" val="0"/>
+                <a14:useLocalDpi xmlns:a14="http://schemas.microsoft.com/office/drawing/2010/main" val="0"/>
               </a:ext>
             </a:extLst>
           </a:blip>

</xml_diff>

<commit_message>
Updated Final Presentation to what we showed
</commit_message>
<xml_diff>
--- a/A Team Documents/Final presentation.pptx
+++ b/A Team Documents/Final presentation.pptx
@@ -5,10 +5,10 @@
     <p:sldMasterId id="2147483780" r:id="rId1"/>
   </p:sldMasterIdLst>
   <p:notesMasterIdLst>
-    <p:notesMasterId r:id="rId26"/>
+    <p:notesMasterId r:id="rId24"/>
   </p:notesMasterIdLst>
   <p:handoutMasterIdLst>
-    <p:handoutMasterId r:id="rId27"/>
+    <p:handoutMasterId r:id="rId25"/>
   </p:handoutMasterIdLst>
   <p:sldIdLst>
     <p:sldId id="338" r:id="rId2"/>
@@ -28,13 +28,11 @@
     <p:sldId id="340" r:id="rId16"/>
     <p:sldId id="342" r:id="rId17"/>
     <p:sldId id="339" r:id="rId18"/>
-    <p:sldId id="337" r:id="rId19"/>
-    <p:sldId id="315" r:id="rId20"/>
-    <p:sldId id="344" r:id="rId21"/>
-    <p:sldId id="318" r:id="rId22"/>
-    <p:sldId id="345" r:id="rId23"/>
-    <p:sldId id="324" r:id="rId24"/>
-    <p:sldId id="295" r:id="rId25"/>
+    <p:sldId id="346" r:id="rId19"/>
+    <p:sldId id="347" r:id="rId20"/>
+    <p:sldId id="348" r:id="rId21"/>
+    <p:sldId id="324" r:id="rId22"/>
+    <p:sldId id="295" r:id="rId23"/>
   </p:sldIdLst>
   <p:sldSz cx="9144000" cy="6858000" type="screen4x3"/>
   <p:notesSz cx="6858000" cy="9144000"/>
@@ -133,6 +131,36 @@
       </a:defRPr>
     </a:lvl9pPr>
   </p:defaultTextStyle>
+  <p:extLst>
+    <p:ext uri="{EFAFB233-063F-42B5-8137-9DF3F51BA10A}">
+      <p15:sldGuideLst xmlns="" xmlns:p15="http://schemas.microsoft.com/office/powerpoint/2012/main">
+        <p15:guide id="1" orient="horz" pos="2160">
+          <p15:clr>
+            <a:srgbClr val="A4A3A4"/>
+          </p15:clr>
+        </p15:guide>
+        <p15:guide id="2" pos="2880">
+          <p15:clr>
+            <a:srgbClr val="A4A3A4"/>
+          </p15:clr>
+        </p15:guide>
+      </p15:sldGuideLst>
+    </p:ext>
+    <p:ext uri="{2D200454-40CA-4A62-9FC3-DE9A4176ACB9}">
+      <p15:notesGuideLst xmlns="" xmlns:p15="http://schemas.microsoft.com/office/powerpoint/2012/main">
+        <p15:guide id="1" orient="horz" pos="2880">
+          <p15:clr>
+            <a:srgbClr val="A4A3A4"/>
+          </p15:clr>
+        </p15:guide>
+        <p15:guide id="2" pos="2160">
+          <p15:clr>
+            <a:srgbClr val="A4A3A4"/>
+          </p15:clr>
+        </p15:guide>
+      </p15:notesGuideLst>
+    </p:ext>
+  </p:extLst>
 </p:presentation>
 </file>
 
@@ -219,7 +247,7 @@
             <a:fld id="{59E2BC62-7E84-44FB-9A81-3B8AD9AE521B}" type="datetimeFigureOut">
               <a:rPr lang="en-US" smtClean="0"/>
               <a:pPr/>
-              <a:t>5/6/2015</a:t>
+              <a:t>5/7/2015</a:t>
             </a:fld>
             <a:endParaRPr lang="en-US"/>
           </a:p>
@@ -295,7 +323,7 @@
     </p:spTree>
     <p:extLst>
       <p:ext uri="{BB962C8B-B14F-4D97-AF65-F5344CB8AC3E}">
-        <p14:creationId xmlns:p14="http://schemas.microsoft.com/office/powerpoint/2010/main" val="2856711207"/>
+        <p14:creationId xmlns="" xmlns:p14="http://schemas.microsoft.com/office/powerpoint/2010/main" val="2856711207"/>
       </p:ext>
     </p:extLst>
   </p:cSld>
@@ -386,7 +414,7 @@
             <a:fld id="{AC4D07E4-89AF-44D2-9F2F-5F6D2623599A}" type="datetimeFigureOut">
               <a:rPr lang="en-US" smtClean="0"/>
               <a:pPr/>
-              <a:t>5/6/2015</a:t>
+              <a:t>5/7/2015</a:t>
             </a:fld>
             <a:endParaRPr lang="en-US"/>
           </a:p>
@@ -557,7 +585,7 @@
     </p:spTree>
     <p:extLst>
       <p:ext uri="{BB962C8B-B14F-4D97-AF65-F5344CB8AC3E}">
-        <p14:creationId xmlns:p14="http://schemas.microsoft.com/office/powerpoint/2010/main" val="3571335044"/>
+        <p14:creationId xmlns="" xmlns:p14="http://schemas.microsoft.com/office/powerpoint/2010/main" val="3571335044"/>
       </p:ext>
     </p:extLst>
   </p:cSld>
@@ -732,6 +760,11 @@
         </p:txBody>
       </p:sp>
     </p:spTree>
+    <p:extLst>
+      <p:ext uri="{BB962C8B-B14F-4D97-AF65-F5344CB8AC3E}">
+        <p14:creationId xmlns="" xmlns:p14="http://schemas.microsoft.com/office/powerpoint/2010/main" val="1698061651"/>
+      </p:ext>
+    </p:extLst>
   </p:cSld>
   <p:clrMapOvr>
     <a:masterClrMapping/>
@@ -1033,6 +1066,11 @@
         </p:txBody>
       </p:sp>
     </p:spTree>
+    <p:extLst>
+      <p:ext uri="{BB962C8B-B14F-4D97-AF65-F5344CB8AC3E}">
+        <p14:creationId xmlns="" xmlns:p14="http://schemas.microsoft.com/office/powerpoint/2010/main" val="3998433475"/>
+      </p:ext>
+    </p:extLst>
   </p:cSld>
   <p:clrMapOvr>
     <a:masterClrMapping/>
@@ -1123,6 +1161,11 @@
         </p:txBody>
       </p:sp>
     </p:spTree>
+    <p:extLst>
+      <p:ext uri="{BB962C8B-B14F-4D97-AF65-F5344CB8AC3E}">
+        <p14:creationId xmlns="" xmlns:p14="http://schemas.microsoft.com/office/powerpoint/2010/main" val="3509777589"/>
+      </p:ext>
+    </p:extLst>
   </p:cSld>
   <p:clrMapOvr>
     <a:masterClrMapping/>
@@ -1213,6 +1256,11 @@
         </p:txBody>
       </p:sp>
     </p:spTree>
+    <p:extLst>
+      <p:ext uri="{BB962C8B-B14F-4D97-AF65-F5344CB8AC3E}">
+        <p14:creationId xmlns="" xmlns:p14="http://schemas.microsoft.com/office/powerpoint/2010/main" val="149690636"/>
+      </p:ext>
+    </p:extLst>
   </p:cSld>
   <p:clrMapOvr>
     <a:masterClrMapping/>
@@ -1295,6 +1343,11 @@
         </p:txBody>
       </p:sp>
     </p:spTree>
+    <p:extLst>
+      <p:ext uri="{BB962C8B-B14F-4D97-AF65-F5344CB8AC3E}">
+        <p14:creationId xmlns="" xmlns:p14="http://schemas.microsoft.com/office/powerpoint/2010/main" val="77536477"/>
+      </p:ext>
+    </p:extLst>
   </p:cSld>
   <p:clrMapOvr>
     <a:masterClrMapping/>
@@ -1399,6 +1452,11 @@
         </p:txBody>
       </p:sp>
     </p:spTree>
+    <p:extLst>
+      <p:ext uri="{BB962C8B-B14F-4D97-AF65-F5344CB8AC3E}">
+        <p14:creationId xmlns="" xmlns:p14="http://schemas.microsoft.com/office/powerpoint/2010/main" val="4220600104"/>
+      </p:ext>
+    </p:extLst>
   </p:cSld>
   <p:clrMapOvr>
     <a:masterClrMapping/>
@@ -1588,7 +1646,7 @@
             <a:fld id="{461E6A8B-52D2-4FB9-BB2D-A053F589DABE}" type="datetimeFigureOut">
               <a:rPr lang="en-US" smtClean="0"/>
               <a:pPr/>
-              <a:t>5/6/2015</a:t>
+              <a:t>5/7/2015</a:t>
             </a:fld>
             <a:endParaRPr lang="en-US" dirty="0"/>
           </a:p>
@@ -1755,7 +1813,7 @@
             <a:fld id="{461E6A8B-52D2-4FB9-BB2D-A053F589DABE}" type="datetimeFigureOut">
               <a:rPr lang="en-US" smtClean="0"/>
               <a:pPr/>
-              <a:t>5/6/2015</a:t>
+              <a:t>5/7/2015</a:t>
             </a:fld>
             <a:endParaRPr lang="en-US"/>
           </a:p>
@@ -1932,7 +1990,7 @@
             <a:fld id="{461E6A8B-52D2-4FB9-BB2D-A053F589DABE}" type="datetimeFigureOut">
               <a:rPr lang="en-US" smtClean="0"/>
               <a:pPr/>
-              <a:t>5/6/2015</a:t>
+              <a:t>5/7/2015</a:t>
             </a:fld>
             <a:endParaRPr lang="en-US"/>
           </a:p>
@@ -2099,7 +2157,7 @@
             <a:fld id="{461E6A8B-52D2-4FB9-BB2D-A053F589DABE}" type="datetimeFigureOut">
               <a:rPr lang="en-US" smtClean="0"/>
               <a:pPr/>
-              <a:t>5/6/2015</a:t>
+              <a:t>5/7/2015</a:t>
             </a:fld>
             <a:endParaRPr lang="en-US"/>
           </a:p>
@@ -2378,7 +2436,7 @@
             <a:fld id="{461E6A8B-52D2-4FB9-BB2D-A053F589DABE}" type="datetimeFigureOut">
               <a:rPr lang="en-US" smtClean="0"/>
               <a:pPr/>
-              <a:t>5/6/2015</a:t>
+              <a:t>5/7/2015</a:t>
             </a:fld>
             <a:endParaRPr lang="en-US"/>
           </a:p>
@@ -2663,7 +2721,7 @@
             <a:fld id="{461E6A8B-52D2-4FB9-BB2D-A053F589DABE}" type="datetimeFigureOut">
               <a:rPr lang="en-US" smtClean="0"/>
               <a:pPr/>
-              <a:t>5/6/2015</a:t>
+              <a:t>5/7/2015</a:t>
             </a:fld>
             <a:endParaRPr lang="en-US"/>
           </a:p>
@@ -3118,7 +3176,7 @@
             <a:fld id="{461E6A8B-52D2-4FB9-BB2D-A053F589DABE}" type="datetimeFigureOut">
               <a:rPr lang="en-US" smtClean="0"/>
               <a:pPr/>
-              <a:t>5/6/2015</a:t>
+              <a:t>5/7/2015</a:t>
             </a:fld>
             <a:endParaRPr lang="en-US"/>
           </a:p>
@@ -3233,7 +3291,7 @@
             <a:fld id="{461E6A8B-52D2-4FB9-BB2D-A053F589DABE}" type="datetimeFigureOut">
               <a:rPr lang="en-US" smtClean="0"/>
               <a:pPr/>
-              <a:t>5/6/2015</a:t>
+              <a:t>5/7/2015</a:t>
             </a:fld>
             <a:endParaRPr lang="en-US"/>
           </a:p>
@@ -3361,7 +3419,7 @@
             <a:fld id="{461E6A8B-52D2-4FB9-BB2D-A053F589DABE}" type="datetimeFigureOut">
               <a:rPr lang="en-US" smtClean="0"/>
               <a:pPr/>
-              <a:t>5/6/2015</a:t>
+              <a:t>5/7/2015</a:t>
             </a:fld>
             <a:endParaRPr lang="en-US"/>
           </a:p>
@@ -3635,7 +3693,7 @@
             <a:fld id="{461E6A8B-52D2-4FB9-BB2D-A053F589DABE}" type="datetimeFigureOut">
               <a:rPr lang="en-US" smtClean="0"/>
               <a:pPr/>
-              <a:t>5/6/2015</a:t>
+              <a:t>5/7/2015</a:t>
             </a:fld>
             <a:endParaRPr lang="en-US"/>
           </a:p>
@@ -3885,7 +3943,7 @@
             <a:fld id="{461E6A8B-52D2-4FB9-BB2D-A053F589DABE}" type="datetimeFigureOut">
               <a:rPr lang="en-US" smtClean="0"/>
               <a:pPr/>
-              <a:t>5/6/2015</a:t>
+              <a:t>5/7/2015</a:t>
             </a:fld>
             <a:endParaRPr lang="en-US"/>
           </a:p>
@@ -4113,7 +4171,7 @@
             <a:fld id="{461E6A8B-52D2-4FB9-BB2D-A053F589DABE}" type="datetimeFigureOut">
               <a:rPr lang="en-US" smtClean="0"/>
               <a:pPr/>
-              <a:t>5/6/2015</a:t>
+              <a:t>5/7/2015</a:t>
             </a:fld>
             <a:endParaRPr lang="en-US"/>
           </a:p>
@@ -5632,7 +5690,7 @@
         </p:nvSpPr>
         <p:spPr>
           <a:xfrm>
-            <a:off x="1295400" y="1447800"/>
+            <a:off x="1295400" y="1905000"/>
             <a:ext cx="7391400" cy="4724400"/>
           </a:xfrm>
         </p:spPr>
@@ -5698,15 +5756,6 @@
             <a:r>
               <a:rPr lang="en-US" sz="2800" dirty="0" smtClean="0"/>
               <a:t>Generates plots as a function of time</a:t>
-            </a:r>
-          </a:p>
-          <a:p>
-            <a:pPr>
-              <a:buNone/>
-            </a:pPr>
-            <a:r>
-              <a:rPr lang="en-US" sz="2800" dirty="0" smtClean="0"/>
-              <a:t>Is Repeatable –successful for 3+  experimental sequences</a:t>
             </a:r>
           </a:p>
         </p:txBody>
@@ -5728,7 +5777,7 @@
         </p:blipFill>
         <p:spPr bwMode="auto">
           <a:xfrm>
-            <a:off x="685800" y="1525442"/>
+            <a:off x="685800" y="1982642"/>
             <a:ext cx="457200" cy="461528"/>
           </a:xfrm>
           <a:prstGeom prst="rect">
@@ -5754,7 +5803,7 @@
         </p:blipFill>
         <p:spPr bwMode="auto">
           <a:xfrm>
-            <a:off x="685800" y="2057400"/>
+            <a:off x="685800" y="2514600"/>
             <a:ext cx="457200" cy="461528"/>
           </a:xfrm>
           <a:prstGeom prst="rect">
@@ -5780,7 +5829,7 @@
         </p:blipFill>
         <p:spPr bwMode="auto">
           <a:xfrm>
-            <a:off x="685800" y="2973242"/>
+            <a:off x="685800" y="3430442"/>
             <a:ext cx="457200" cy="461528"/>
           </a:xfrm>
           <a:prstGeom prst="rect">
@@ -5806,7 +5855,7 @@
         </p:blipFill>
         <p:spPr bwMode="auto">
           <a:xfrm>
-            <a:off x="685800" y="3429000"/>
+            <a:off x="685800" y="3886200"/>
             <a:ext cx="457200" cy="461528"/>
           </a:xfrm>
           <a:prstGeom prst="rect">
@@ -5832,7 +5881,7 @@
         </p:blipFill>
         <p:spPr bwMode="auto">
           <a:xfrm>
-            <a:off x="685800" y="3962400"/>
+            <a:off x="685800" y="4419600"/>
             <a:ext cx="457200" cy="461528"/>
           </a:xfrm>
           <a:prstGeom prst="rect">
@@ -5858,33 +5907,7 @@
         </p:blipFill>
         <p:spPr bwMode="auto">
           <a:xfrm>
-            <a:off x="685800" y="4494358"/>
-            <a:ext cx="457200" cy="461528"/>
-          </a:xfrm>
-          <a:prstGeom prst="rect">
-            <a:avLst/>
-          </a:prstGeom>
-          <a:noFill/>
-        </p:spPr>
-      </p:pic>
-      <p:pic>
-        <p:nvPicPr>
-          <p:cNvPr id="13" name="Picture 4" descr="http://pixabay.com/static/uploads/photo/2014/04/02/10/12/checkbox-303113_640.png"/>
-          <p:cNvPicPr>
-            <a:picLocks noChangeAspect="1" noChangeArrowheads="1"/>
-          </p:cNvPicPr>
-          <p:nvPr/>
-        </p:nvPicPr>
-        <p:blipFill>
-          <a:blip r:embed="rId2" cstate="print"/>
-          <a:srcRect/>
-          <a:stretch>
-            <a:fillRect/>
-          </a:stretch>
-        </p:blipFill>
-        <p:spPr bwMode="auto">
-          <a:xfrm>
-            <a:off x="685800" y="5029200"/>
+            <a:off x="685800" y="4951558"/>
             <a:ext cx="457200" cy="461528"/>
           </a:xfrm>
           <a:prstGeom prst="rect">
@@ -6293,226 +6316,35 @@
             <p:ph sz="half" idx="1"/>
           </p:nvPr>
         </p:nvSpPr>
-        <p:spPr/>
+        <p:spPr>
+          <a:xfrm>
+            <a:off x="457200" y="1828800"/>
+            <a:ext cx="7924800" cy="4297363"/>
+          </a:xfrm>
+        </p:spPr>
         <p:txBody>
           <a:bodyPr>
-            <a:normAutofit lnSpcReduction="10000"/>
+            <a:normAutofit/>
           </a:bodyPr>
           <a:lstStyle/>
           <a:p>
             <a:r>
-              <a:rPr lang="en-US" dirty="0" smtClean="0"/>
-              <a:t>Run – Stop – Run again sequence may interrupt thread processes – cause crash</a:t>
-            </a:r>
-          </a:p>
-          <a:p>
-            <a:r>
-              <a:rPr lang="en-US" dirty="0" smtClean="0"/>
-              <a:t>Similar issue with Exiting Tool during IO</a:t>
-            </a:r>
-          </a:p>
-          <a:p>
-            <a:r>
-              <a:rPr lang="en-US" dirty="0" smtClean="0"/>
-              <a:t>Base/Needle height may not be measured accurately, will affect results</a:t>
-            </a:r>
-          </a:p>
-        </p:txBody>
-      </p:sp>
-      <p:pic>
-        <p:nvPicPr>
-          <p:cNvPr id="7" name="Picture 6"/>
-          <p:cNvPicPr/>
-          <p:nvPr/>
-        </p:nvPicPr>
-        <p:blipFill>
-          <a:blip r:embed="rId2" cstate="print"/>
-          <a:srcRect/>
-          <a:stretch>
-            <a:fillRect/>
-          </a:stretch>
-        </p:blipFill>
-        <p:spPr bwMode="auto">
-          <a:xfrm>
-            <a:off x="4572000" y="2408767"/>
-            <a:ext cx="1219200" cy="791633"/>
-          </a:xfrm>
-          <a:prstGeom prst="rect">
-            <a:avLst/>
-          </a:prstGeom>
-          <a:noFill/>
-          <a:ln w="9525">
-            <a:noFill/>
-            <a:miter lim="800000"/>
-            <a:headEnd/>
-            <a:tailEnd/>
-          </a:ln>
-        </p:spPr>
-      </p:pic>
-      <p:pic>
-        <p:nvPicPr>
-          <p:cNvPr id="8" name="Picture 7"/>
-          <p:cNvPicPr/>
-          <p:nvPr/>
-        </p:nvPicPr>
-        <p:blipFill>
-          <a:blip r:embed="rId3" cstate="print"/>
-          <a:srcRect/>
-          <a:stretch>
-            <a:fillRect/>
-          </a:stretch>
-        </p:blipFill>
-        <p:spPr bwMode="auto">
-          <a:xfrm>
-            <a:off x="6096000" y="2408767"/>
-            <a:ext cx="1250527" cy="760307"/>
-          </a:xfrm>
-          <a:prstGeom prst="rect">
-            <a:avLst/>
-          </a:prstGeom>
-          <a:noFill/>
-          <a:ln w="9525">
-            <a:noFill/>
-            <a:miter lim="800000"/>
-            <a:headEnd/>
-            <a:tailEnd/>
-          </a:ln>
-        </p:spPr>
-      </p:pic>
-      <p:pic>
-        <p:nvPicPr>
-          <p:cNvPr id="9" name="Picture 8"/>
-          <p:cNvPicPr/>
-          <p:nvPr/>
-        </p:nvPicPr>
-        <p:blipFill>
-          <a:blip r:embed="rId2" cstate="print"/>
-          <a:srcRect/>
-          <a:stretch>
-            <a:fillRect/>
-          </a:stretch>
-        </p:blipFill>
-        <p:spPr bwMode="auto">
-          <a:xfrm>
-            <a:off x="7543800" y="2408767"/>
-            <a:ext cx="1219200" cy="791633"/>
-          </a:xfrm>
-          <a:prstGeom prst="rect">
-            <a:avLst/>
-          </a:prstGeom>
-          <a:noFill/>
-          <a:ln w="9525">
-            <a:noFill/>
-            <a:miter lim="800000"/>
-            <a:headEnd/>
-            <a:tailEnd/>
-          </a:ln>
-        </p:spPr>
-      </p:pic>
-      <p:cxnSp>
-        <p:nvCxnSpPr>
-          <p:cNvPr id="11" name="Straight Arrow Connector 10"/>
-          <p:cNvCxnSpPr>
-            <a:stCxn id="7" idx="3"/>
-            <a:endCxn id="8" idx="1"/>
-          </p:cNvCxnSpPr>
-          <p:nvPr/>
-        </p:nvCxnSpPr>
-        <p:spPr>
-          <a:xfrm flipV="1">
-            <a:off x="5791200" y="2788921"/>
-            <a:ext cx="304800" cy="15663"/>
-          </a:xfrm>
-          <a:prstGeom prst="straightConnector1">
-            <a:avLst/>
-          </a:prstGeom>
-          <a:ln>
-            <a:tailEnd type="arrow"/>
-          </a:ln>
-        </p:spPr>
-        <p:style>
-          <a:lnRef idx="1">
-            <a:schemeClr val="accent1"/>
-          </a:lnRef>
-          <a:fillRef idx="0">
-            <a:schemeClr val="accent1"/>
-          </a:fillRef>
-          <a:effectRef idx="0">
-            <a:schemeClr val="accent1"/>
-          </a:effectRef>
-          <a:fontRef idx="minor">
-            <a:schemeClr val="tx1"/>
-          </a:fontRef>
-        </p:style>
-      </p:cxnSp>
-      <p:cxnSp>
-        <p:nvCxnSpPr>
-          <p:cNvPr id="13" name="Straight Arrow Connector 12"/>
-          <p:cNvCxnSpPr>
-            <a:stCxn id="8" idx="3"/>
-            <a:endCxn id="9" idx="1"/>
-          </p:cNvCxnSpPr>
-          <p:nvPr/>
-        </p:nvCxnSpPr>
-        <p:spPr>
-          <a:xfrm>
-            <a:off x="7346527" y="2788921"/>
-            <a:ext cx="197273" cy="15663"/>
-          </a:xfrm>
-          <a:prstGeom prst="straightConnector1">
-            <a:avLst/>
-          </a:prstGeom>
-          <a:ln>
-            <a:tailEnd type="arrow"/>
-          </a:ln>
-        </p:spPr>
-        <p:style>
-          <a:lnRef idx="1">
-            <a:schemeClr val="accent1"/>
-          </a:lnRef>
-          <a:fillRef idx="0">
-            <a:schemeClr val="accent1"/>
-          </a:fillRef>
-          <a:effectRef idx="0">
-            <a:schemeClr val="accent1"/>
-          </a:effectRef>
-          <a:fontRef idx="minor">
-            <a:schemeClr val="tx1"/>
-          </a:fontRef>
-        </p:style>
-      </p:cxnSp>
-      <p:pic>
-        <p:nvPicPr>
-          <p:cNvPr id="2050" name="Picture 2"/>
-          <p:cNvPicPr>
-            <a:picLocks noChangeAspect="1" noChangeArrowheads="1"/>
-          </p:cNvPicPr>
-          <p:nvPr/>
-        </p:nvPicPr>
-        <p:blipFill>
-          <a:blip r:embed="rId4" cstate="print"/>
-          <a:srcRect r="4278" b="15789"/>
-          <a:stretch>
-            <a:fillRect/>
-          </a:stretch>
-        </p:blipFill>
-        <p:spPr bwMode="auto">
-          <a:xfrm>
-            <a:off x="4419600" y="4800600"/>
-            <a:ext cx="4724400" cy="281528"/>
-          </a:xfrm>
-          <a:prstGeom prst="rect">
-            <a:avLst/>
-          </a:prstGeom>
-          <a:noFill/>
-          <a:ln w="9525">
-            <a:noFill/>
-            <a:miter lim="800000"/>
-            <a:headEnd/>
-            <a:tailEnd/>
-          </a:ln>
-        </p:spPr>
-      </p:pic>
+              <a:rPr lang="en-US" sz="4400" dirty="0" smtClean="0"/>
+              <a:t>Interfering with Excel output before processing finishes crashes project</a:t>
+            </a:r>
+          </a:p>
+          <a:p>
+            <a:r>
+              <a:rPr lang="en-US" sz="4400" dirty="0" smtClean="0"/>
+              <a:t>Base/Needle </a:t>
+            </a:r>
+            <a:r>
+              <a:rPr lang="en-US" sz="4400" dirty="0" smtClean="0"/>
+              <a:t>height may not be measured accurately, will affect results</a:t>
+            </a:r>
+          </a:p>
+        </p:txBody>
+      </p:sp>
     </p:spTree>
   </p:cSld>
   <p:clrMapOvr>
@@ -6608,7 +6440,7 @@
     </p:spTree>
     <p:extLst>
       <p:ext uri="{BB962C8B-B14F-4D97-AF65-F5344CB8AC3E}">
-        <p14:creationId xmlns:p14="http://schemas.microsoft.com/office/powerpoint/2010/main" val="2037226595"/>
+        <p14:creationId xmlns="" xmlns:p14="http://schemas.microsoft.com/office/powerpoint/2010/main" val="2037226595"/>
       </p:ext>
     </p:extLst>
   </p:cSld>
@@ -6922,7 +6754,7 @@
           <a:blip r:embed="rId2" cstate="print">
             <a:extLst>
               <a:ext uri="{28A0092B-C50C-407E-A947-70E740481C1C}">
-                <a14:useLocalDpi xmlns:a14="http://schemas.microsoft.com/office/drawing/2010/main" val="0"/>
+                <a14:useLocalDpi xmlns="" xmlns:a14="http://schemas.microsoft.com/office/drawing/2010/main" val="0"/>
               </a:ext>
             </a:extLst>
           </a:blip>
@@ -6994,7 +6826,7 @@
           <a:p>
             <a:r>
               <a:rPr lang="en-US" dirty="0" smtClean="0"/>
-              <a:t>Hypothetical – Anne</a:t>
+              <a:t>Hypothetical </a:t>
             </a:r>
             <a:endParaRPr lang="en-US" dirty="0"/>
           </a:p>
@@ -7012,84 +6844,85 @@
         </p:nvSpPr>
         <p:spPr/>
         <p:txBody>
-          <a:bodyPr>
-            <a:normAutofit fontScale="85000" lnSpcReduction="20000"/>
-          </a:bodyPr>
+          <a:bodyPr/>
           <a:lstStyle/>
           <a:p>
             <a:r>
-              <a:rPr lang="en-US" dirty="0" smtClean="0"/>
+              <a:rPr lang="en-US" sz="3600" dirty="0"/>
               <a:t>What if we had more time?</a:t>
             </a:r>
           </a:p>
           <a:p>
             <a:pPr lvl="1"/>
             <a:r>
-              <a:rPr lang="en-US" dirty="0" smtClean="0"/>
-              <a:t>Improve processing time, design of interface (change color scheme of form, more feedback from tool), ensure customer satisfaction</a:t>
-            </a:r>
-          </a:p>
-          <a:p>
-            <a:r>
-              <a:rPr lang="en-US" dirty="0" smtClean="0"/>
-              <a:t>What if we could start over?</a:t>
+              <a:rPr lang="en-US" sz="3200" dirty="0"/>
+              <a:t>D</a:t>
+            </a:r>
+            <a:r>
+              <a:rPr lang="en-US" sz="3200" dirty="0" smtClean="0"/>
+              <a:t>esign </a:t>
+            </a:r>
+            <a:r>
+              <a:rPr lang="en-US" sz="3200" dirty="0"/>
+              <a:t>of interface (change color scheme of form, more feedback from tool</a:t>
+            </a:r>
+            <a:r>
+              <a:rPr lang="en-US" sz="3200" dirty="0" smtClean="0"/>
+              <a:t>)</a:t>
             </a:r>
           </a:p>
           <a:p>
             <a:pPr lvl="1"/>
             <a:r>
-              <a:rPr lang="en-US" dirty="0" smtClean="0"/>
-              <a:t>Start coding sooner</a:t>
+              <a:rPr lang="en-US" sz="3200" dirty="0"/>
+              <a:t>E</a:t>
+            </a:r>
+            <a:r>
+              <a:rPr lang="en-US" sz="3200" dirty="0" smtClean="0"/>
+              <a:t>nsure </a:t>
+            </a:r>
+            <a:r>
+              <a:rPr lang="en-US" sz="3200" dirty="0"/>
+              <a:t>customer </a:t>
+            </a:r>
+            <a:r>
+              <a:rPr lang="en-US" sz="3200" dirty="0" smtClean="0"/>
+              <a:t>satisfaction</a:t>
             </a:r>
           </a:p>
           <a:p>
             <a:pPr lvl="1"/>
             <a:r>
-              <a:rPr lang="en-US" dirty="0" smtClean="0"/>
-              <a:t>Plan/work on more defined, divided goals/milestones</a:t>
+              <a:rPr lang="en-US" sz="3200" dirty="0"/>
+              <a:t>Test the project more </a:t>
+            </a:r>
+            <a:r>
+              <a:rPr lang="en-US" sz="3200" dirty="0" smtClean="0"/>
+              <a:t>thoroughly</a:t>
             </a:r>
           </a:p>
           <a:p>
             <a:pPr lvl="1"/>
             <a:r>
-              <a:rPr lang="en-US" dirty="0" smtClean="0"/>
-              <a:t>Interact more with customer</a:t>
-            </a:r>
-          </a:p>
-          <a:p>
-            <a:r>
-              <a:rPr lang="en-US" dirty="0" smtClean="0"/>
-              <a:t>What I learned</a:t>
-            </a:r>
-          </a:p>
-          <a:p>
-            <a:pPr lvl="1"/>
-            <a:r>
-              <a:rPr lang="en-US" dirty="0" smtClean="0"/>
-              <a:t>Image processing/manipulation through C#</a:t>
-            </a:r>
-          </a:p>
-          <a:p>
-            <a:pPr lvl="1"/>
-            <a:r>
-              <a:rPr lang="en-US" dirty="0" smtClean="0"/>
-              <a:t>Software Engineering Documentation</a:t>
-            </a:r>
-          </a:p>
-          <a:p>
-            <a:pPr lvl="1"/>
-            <a:r>
-              <a:rPr lang="en-US" dirty="0" smtClean="0"/>
-              <a:t>Team work/brainstorming</a:t>
+              <a:rPr lang="en-US" sz="3200" dirty="0"/>
+              <a:t>Improve processing time</a:t>
             </a:r>
           </a:p>
           <a:p>
             <a:pPr lvl="1"/>
             <a:endParaRPr lang="en-US" dirty="0"/>
           </a:p>
+          <a:p>
+            <a:endParaRPr lang="en-US" dirty="0"/>
+          </a:p>
         </p:txBody>
       </p:sp>
     </p:spTree>
+    <p:extLst>
+      <p:ext uri="{BB962C8B-B14F-4D97-AF65-F5344CB8AC3E}">
+        <p14:creationId xmlns="" xmlns:p14="http://schemas.microsoft.com/office/powerpoint/2010/main" val="734113131"/>
+      </p:ext>
+    </p:extLst>
   </p:cSld>
   <p:clrMapOvr>
     <a:masterClrMapping/>
@@ -7138,11 +6971,7 @@
           <a:p>
             <a:r>
               <a:rPr lang="en-US" dirty="0" smtClean="0"/>
-              <a:t>Hypothetical – </a:t>
-            </a:r>
-            <a:r>
-              <a:rPr lang="en-US" dirty="0" err="1" smtClean="0"/>
-              <a:t>Sanan</a:t>
+              <a:t>Hypothetical </a:t>
             </a:r>
             <a:endParaRPr lang="en-US" dirty="0"/>
           </a:p>
@@ -7164,68 +6993,65 @@
           <a:lstStyle/>
           <a:p>
             <a:r>
-              <a:rPr lang="en-US" dirty="0" smtClean="0"/>
-              <a:t>What if we had more time</a:t>
-            </a:r>
-            <a:r>
-              <a:rPr lang="en-US" dirty="0" smtClean="0"/>
-              <a:t>?</a:t>
+              <a:rPr lang="en-US" sz="4000" dirty="0"/>
+              <a:t>What if we could start over?</a:t>
             </a:r>
           </a:p>
           <a:p>
             <a:pPr lvl="1"/>
             <a:r>
-              <a:rPr lang="en-US" dirty="0" smtClean="0"/>
-              <a:t>Test the project more thoroughly</a:t>
-            </a:r>
-            <a:endParaRPr lang="en-US" dirty="0" smtClean="0"/>
-          </a:p>
-          <a:p>
-            <a:r>
-              <a:rPr lang="en-US" dirty="0" smtClean="0"/>
-              <a:t>What if we could start over</a:t>
-            </a:r>
-            <a:r>
-              <a:rPr lang="en-US" dirty="0" smtClean="0"/>
-              <a:t>?</a:t>
+              <a:rPr lang="en-US" sz="3600" dirty="0"/>
+              <a:t>Begin testing </a:t>
+            </a:r>
+            <a:r>
+              <a:rPr lang="en-US" sz="3600" dirty="0" smtClean="0"/>
+              <a:t>earlier</a:t>
             </a:r>
           </a:p>
           <a:p>
             <a:pPr lvl="1"/>
             <a:r>
-              <a:rPr lang="en-US" dirty="0" smtClean="0"/>
-              <a:t>Begin testing earlier</a:t>
-            </a:r>
-            <a:endParaRPr lang="en-US" dirty="0" smtClean="0"/>
-          </a:p>
-          <a:p>
-            <a:r>
-              <a:rPr lang="en-US" dirty="0" smtClean="0"/>
-              <a:t>What </a:t>
-            </a:r>
-            <a:r>
-              <a:rPr lang="en-US" dirty="0" smtClean="0"/>
-              <a:t>I learned</a:t>
+              <a:rPr lang="en-US" sz="3600" dirty="0"/>
+              <a:t>Communicate more with clients</a:t>
             </a:r>
           </a:p>
           <a:p>
             <a:pPr lvl="1"/>
             <a:r>
-              <a:rPr lang="en-US" dirty="0" smtClean="0"/>
-              <a:t>How teams work in real world projects</a:t>
+              <a:rPr lang="en-US" sz="3600" dirty="0" smtClean="0"/>
+              <a:t>Have </a:t>
+            </a:r>
+            <a:r>
+              <a:rPr lang="en-US" sz="3600" dirty="0"/>
+              <a:t>necessary resources</a:t>
             </a:r>
           </a:p>
           <a:p>
             <a:pPr lvl="1"/>
             <a:r>
-              <a:rPr lang="en-US" dirty="0" smtClean="0"/>
-              <a:t>Documentation &amp; testing</a:t>
-            </a:r>
+              <a:rPr lang="en-US" sz="3600" dirty="0"/>
+              <a:t>Consider an Agile development approach</a:t>
+            </a:r>
+          </a:p>
+          <a:p>
+            <a:pPr lvl="1"/>
             <a:endParaRPr lang="en-US" dirty="0"/>
           </a:p>
+          <a:p>
+            <a:pPr lvl="1"/>
+            <a:endParaRPr lang="en-US" dirty="0"/>
+          </a:p>
+          <a:p>
+            <a:endParaRPr lang="en-US" dirty="0"/>
+          </a:p>
         </p:txBody>
       </p:sp>
     </p:spTree>
+    <p:extLst>
+      <p:ext uri="{BB962C8B-B14F-4D97-AF65-F5344CB8AC3E}">
+        <p14:creationId xmlns="" xmlns:p14="http://schemas.microsoft.com/office/powerpoint/2010/main" val="4294037625"/>
+      </p:ext>
+    </p:extLst>
   </p:cSld>
   <p:clrMapOvr>
     <a:masterClrMapping/>
@@ -7307,7 +7133,6 @@
               <a:rPr lang="en-US" dirty="0" smtClean="0"/>
               <a:t>Problem Description</a:t>
             </a:r>
-            <a:endParaRPr lang="en-US" dirty="0" smtClean="0"/>
           </a:p>
           <a:p>
             <a:r>
@@ -7344,7 +7169,6 @@
               <a:rPr lang="en-US" dirty="0" smtClean="0"/>
               <a:t>Conclusion</a:t>
             </a:r>
-            <a:endParaRPr lang="en-US" dirty="0" smtClean="0"/>
           </a:p>
           <a:p>
             <a:endParaRPr lang="en-US" dirty="0" smtClean="0"/>
@@ -7438,12 +7262,8 @@
           <a:lstStyle/>
           <a:p>
             <a:r>
-              <a:rPr lang="en-US" dirty="0"/>
-              <a:t>Hypothetical - </a:t>
-            </a:r>
-            <a:r>
-              <a:rPr lang="en-US" dirty="0" err="1"/>
-              <a:t>Romando</a:t>
+              <a:rPr lang="en-US" dirty="0" smtClean="0"/>
+              <a:t>Hypothetical </a:t>
             </a:r>
             <a:endParaRPr lang="en-US" dirty="0"/>
           </a:p>
@@ -7461,88 +7281,85 @@
         </p:nvSpPr>
         <p:spPr/>
         <p:txBody>
-          <a:bodyPr>
-            <a:normAutofit lnSpcReduction="10000"/>
-          </a:bodyPr>
+          <a:bodyPr/>
           <a:lstStyle/>
           <a:p>
             <a:r>
-              <a:rPr lang="en-US" dirty="0" smtClean="0"/>
-              <a:t>What if we had more time</a:t>
-            </a:r>
-            <a:r>
-              <a:rPr lang="en-US" dirty="0" smtClean="0"/>
-              <a:t>?</a:t>
+              <a:rPr lang="en-US" sz="4000" dirty="0"/>
+              <a:t>What w</a:t>
+            </a:r>
+            <a:r>
+              <a:rPr lang="en-US" sz="4000" dirty="0" smtClean="0"/>
+              <a:t>e </a:t>
+            </a:r>
+            <a:r>
+              <a:rPr lang="en-US" sz="4000" dirty="0"/>
+              <a:t>learned</a:t>
             </a:r>
           </a:p>
           <a:p>
             <a:pPr lvl="1"/>
             <a:r>
-              <a:rPr lang="en-US" dirty="0"/>
-              <a:t>Perform more testing</a:t>
-            </a:r>
-          </a:p>
-          <a:p>
-            <a:r>
-              <a:rPr lang="en-US" dirty="0" smtClean="0"/>
-              <a:t>What </a:t>
-            </a:r>
-            <a:r>
-              <a:rPr lang="en-US" dirty="0" smtClean="0"/>
-              <a:t>if we could start over</a:t>
-            </a:r>
-            <a:r>
-              <a:rPr lang="en-US" dirty="0" smtClean="0"/>
-              <a:t>?</a:t>
+              <a:rPr lang="en-US" sz="3200" dirty="0"/>
+              <a:t>Teamwork</a:t>
             </a:r>
           </a:p>
           <a:p>
             <a:pPr lvl="1"/>
             <a:r>
-              <a:rPr lang="en-US" dirty="0"/>
-              <a:t>Communicate more with clients</a:t>
+              <a:rPr lang="en-US" sz="3200" dirty="0" smtClean="0"/>
+              <a:t>Documentation </a:t>
+            </a:r>
+            <a:r>
+              <a:rPr lang="en-US" sz="3200" dirty="0"/>
+              <a:t>&amp; testing</a:t>
             </a:r>
           </a:p>
           <a:p>
             <a:pPr lvl="1"/>
             <a:r>
-              <a:rPr lang="en-US" dirty="0"/>
-              <a:t> Have necessary resources</a:t>
-            </a:r>
-          </a:p>
-          <a:p>
-            <a:r>
-              <a:rPr lang="en-US" dirty="0" smtClean="0"/>
-              <a:t>What I learned</a:t>
+              <a:rPr lang="en-US" sz="3200" dirty="0"/>
+              <a:t>Link components together using COM</a:t>
             </a:r>
           </a:p>
           <a:p>
             <a:pPr lvl="1"/>
             <a:r>
-              <a:rPr lang="en-US" dirty="0"/>
-              <a:t>Link components together using COM</a:t>
+              <a:rPr lang="en-US" sz="3200" dirty="0"/>
+              <a:t>Proper software development process</a:t>
             </a:r>
           </a:p>
           <a:p>
             <a:pPr lvl="1"/>
             <a:r>
-              <a:rPr lang="en-US" dirty="0"/>
-              <a:t> Importance of documentation/designs</a:t>
+              <a:rPr lang="en-US" sz="3200" dirty="0"/>
+              <a:t>Practical use of multithreading</a:t>
             </a:r>
           </a:p>
           <a:p>
             <a:pPr lvl="1"/>
             <a:r>
-              <a:rPr lang="en-US" dirty="0"/>
-              <a:t> Teamwork</a:t>
-            </a:r>
+              <a:rPr lang="en-US" sz="3200" dirty="0" smtClean="0"/>
+              <a:t>Time management skills</a:t>
+            </a:r>
+          </a:p>
+          <a:p>
+            <a:pPr lvl="1"/>
+            <a:endParaRPr lang="en-US" dirty="0"/>
+          </a:p>
+          <a:p>
+            <a:pPr lvl="1"/>
+            <a:endParaRPr lang="en-US" dirty="0"/>
+          </a:p>
+          <a:p>
+            <a:endParaRPr lang="en-US" dirty="0"/>
           </a:p>
         </p:txBody>
       </p:sp>
     </p:spTree>
     <p:extLst>
       <p:ext uri="{BB962C8B-B14F-4D97-AF65-F5344CB8AC3E}">
-        <p14:creationId xmlns:p14="http://schemas.microsoft.com/office/powerpoint/2010/main" val="2873693614"/>
+        <p14:creationId xmlns="" xmlns:p14="http://schemas.microsoft.com/office/powerpoint/2010/main" val="1697578852"/>
       </p:ext>
     </p:extLst>
   </p:cSld>
@@ -7593,7 +7410,7 @@
           <a:p>
             <a:r>
               <a:rPr lang="en-US" dirty="0" smtClean="0"/>
-              <a:t>Hypothetical – James</a:t>
+              <a:t>Conclusion</a:t>
             </a:r>
             <a:endParaRPr lang="en-US" dirty="0"/>
           </a:p>
@@ -7601,200 +7418,96 @@
       </p:sp>
       <p:sp>
         <p:nvSpPr>
-          <p:cNvPr id="3" name="Content Placeholder 2"/>
-          <p:cNvSpPr>
-            <a:spLocks noGrp="1"/>
-          </p:cNvSpPr>
-          <p:nvPr>
-            <p:ph idx="1"/>
+          <p:cNvPr id="6" name="Content Placeholder 5"/>
+          <p:cNvSpPr>
+            <a:spLocks noGrp="1"/>
+          </p:cNvSpPr>
+          <p:nvPr>
+            <p:ph sz="half" idx="1"/>
+          </p:nvPr>
+        </p:nvSpPr>
+        <p:spPr>
+          <a:xfrm>
+            <a:off x="457200" y="1600200"/>
+            <a:ext cx="8153400" cy="4525963"/>
+          </a:xfrm>
+        </p:spPr>
+        <p:txBody>
+          <a:bodyPr>
+            <a:normAutofit/>
+          </a:bodyPr>
+          <a:lstStyle/>
+          <a:p>
+            <a:r>
+              <a:rPr lang="en-US" sz="3600" dirty="0" smtClean="0"/>
+              <a:t>Project is overall success</a:t>
+            </a:r>
+          </a:p>
+          <a:p>
+            <a:pPr lvl="1"/>
+            <a:r>
+              <a:rPr lang="en-US" sz="3600" dirty="0" smtClean="0"/>
+              <a:t>Almost every goal achieved</a:t>
+            </a:r>
+          </a:p>
+          <a:p>
+            <a:pPr lvl="1"/>
+            <a:r>
+              <a:rPr lang="en-US" sz="3600" dirty="0" smtClean="0"/>
+              <a:t>Accurate results</a:t>
+            </a:r>
+          </a:p>
+          <a:p>
+            <a:pPr lvl="1"/>
+            <a:r>
+              <a:rPr lang="en-US" sz="3600" dirty="0" smtClean="0"/>
+              <a:t>Highly automated (Little user interaction)</a:t>
+            </a:r>
+          </a:p>
+          <a:p>
+            <a:pPr lvl="1"/>
+            <a:r>
+              <a:rPr lang="en-US" sz="3600" dirty="0" smtClean="0"/>
+              <a:t>Structured development process</a:t>
+            </a:r>
+            <a:endParaRPr lang="en-US" sz="3600" dirty="0"/>
+          </a:p>
+        </p:txBody>
+      </p:sp>
+      <p:sp>
+        <p:nvSpPr>
+          <p:cNvPr id="5" name="Content Placeholder 4"/>
+          <p:cNvSpPr>
+            <a:spLocks noGrp="1"/>
+          </p:cNvSpPr>
+          <p:nvPr>
+            <p:ph sz="half" idx="2"/>
           </p:nvPr>
         </p:nvSpPr>
         <p:spPr/>
         <p:txBody>
-          <a:bodyPr/>
+          <a:bodyPr>
+            <a:normAutofit/>
+          </a:bodyPr>
           <a:lstStyle/>
           <a:p>
-            <a:r>
-              <a:rPr lang="en-US" dirty="0" smtClean="0"/>
-              <a:t>What if we had more time?</a:t>
-            </a:r>
-          </a:p>
-          <a:p>
-            <a:pPr lvl="1"/>
-            <a:r>
-              <a:rPr lang="en-US" dirty="0" smtClean="0"/>
-              <a:t>Further optimization of process time</a:t>
-            </a:r>
-          </a:p>
-          <a:p>
-            <a:r>
-              <a:rPr lang="en-US" dirty="0" smtClean="0"/>
-              <a:t>What if we could start over?</a:t>
-            </a:r>
-          </a:p>
-          <a:p>
-            <a:pPr lvl="1"/>
-            <a:r>
-              <a:rPr lang="en-US" dirty="0" smtClean="0"/>
-              <a:t>Collaborate with customer more often</a:t>
-            </a:r>
-          </a:p>
-          <a:p>
-            <a:pPr lvl="1"/>
-            <a:r>
-              <a:rPr lang="en-US" dirty="0" smtClean="0"/>
-              <a:t>Consider an Agile development approach</a:t>
-            </a:r>
-          </a:p>
-          <a:p>
-            <a:r>
-              <a:rPr lang="en-US" dirty="0" smtClean="0"/>
-              <a:t>What I learned</a:t>
-            </a:r>
-          </a:p>
-          <a:p>
-            <a:pPr lvl="1"/>
-            <a:r>
-              <a:rPr lang="en-US" dirty="0"/>
-              <a:t>Proper software development process</a:t>
-            </a:r>
-          </a:p>
-          <a:p>
-            <a:pPr lvl="1"/>
-            <a:r>
-              <a:rPr lang="en-US" dirty="0" smtClean="0"/>
-              <a:t>Practical use of multithreading</a:t>
-            </a:r>
-          </a:p>
-        </p:txBody>
-      </p:sp>
-    </p:spTree>
-  </p:cSld>
-  <p:clrMapOvr>
-    <a:masterClrMapping/>
-  </p:clrMapOvr>
-  <p:timing>
-    <p:tnLst>
-      <p:par>
-        <p:cTn id="1" dur="indefinite" restart="never" nodeType="tmRoot"/>
-      </p:par>
-    </p:tnLst>
-  </p:timing>
-</p:sld>
-</file>
-
-<file path=ppt/slides/slide22.xml><?xml version="1.0" encoding="utf-8"?>
-<p:sld xmlns:a="http://schemas.openxmlformats.org/drawingml/2006/main" xmlns:r="http://schemas.openxmlformats.org/officeDocument/2006/relationships" xmlns:p="http://schemas.openxmlformats.org/presentationml/2006/main">
-  <p:cSld>
-    <p:spTree>
-      <p:nvGrpSpPr>
-        <p:cNvPr id="1" name=""/>
-        <p:cNvGrpSpPr/>
-        <p:nvPr/>
-      </p:nvGrpSpPr>
-      <p:grpSpPr>
-        <a:xfrm>
-          <a:off x="0" y="0"/>
-          <a:ext cx="0" cy="0"/>
-          <a:chOff x="0" y="0"/>
-          <a:chExt cx="0" cy="0"/>
-        </a:xfrm>
-      </p:grpSpPr>
-      <p:sp>
-        <p:nvSpPr>
-          <p:cNvPr id="2" name="Title 1"/>
-          <p:cNvSpPr>
-            <a:spLocks noGrp="1"/>
-          </p:cNvSpPr>
-          <p:nvPr>
-            <p:ph type="title"/>
-          </p:nvPr>
-        </p:nvSpPr>
-        <p:spPr/>
-        <p:txBody>
-          <a:bodyPr/>
-          <a:lstStyle/>
-          <a:p>
-            <a:r>
-              <a:rPr lang="en-US" dirty="0" smtClean="0"/>
-              <a:t>Hypothetical – </a:t>
-            </a:r>
-            <a:r>
-              <a:rPr lang="en-US" dirty="0" err="1" smtClean="0"/>
-              <a:t>Hieu</a:t>
-            </a:r>
+            <a:endParaRPr lang="en-US" sz="3600" dirty="0" smtClean="0"/>
+          </a:p>
+          <a:p>
+            <a:endParaRPr lang="en-US" dirty="0" smtClean="0"/>
+          </a:p>
+          <a:p>
+            <a:endParaRPr lang="en-US" dirty="0" smtClean="0"/>
+          </a:p>
+          <a:p>
             <a:endParaRPr lang="en-US" dirty="0"/>
-          </a:p>
-        </p:txBody>
-      </p:sp>
-      <p:sp>
-        <p:nvSpPr>
-          <p:cNvPr id="3" name="Content Placeholder 2"/>
-          <p:cNvSpPr>
-            <a:spLocks noGrp="1"/>
-          </p:cNvSpPr>
-          <p:nvPr>
-            <p:ph idx="1"/>
-          </p:nvPr>
-        </p:nvSpPr>
-        <p:spPr/>
-        <p:txBody>
-          <a:bodyPr/>
-          <a:lstStyle/>
-          <a:p>
-            <a:r>
-              <a:rPr lang="en-US" dirty="0" smtClean="0"/>
-              <a:t>What if we had more time?</a:t>
-            </a:r>
-          </a:p>
-          <a:p>
-            <a:pPr lvl="1"/>
-            <a:r>
-              <a:rPr lang="en-US" dirty="0" smtClean="0"/>
-              <a:t>Improve software performance time</a:t>
-            </a:r>
-          </a:p>
-          <a:p>
-            <a:r>
-              <a:rPr lang="en-US" dirty="0" smtClean="0"/>
-              <a:t>What if we could start over?</a:t>
-            </a:r>
-          </a:p>
-          <a:p>
-            <a:pPr lvl="1"/>
-            <a:r>
-              <a:rPr lang="en-US" dirty="0" smtClean="0"/>
-              <a:t>Better communication with client</a:t>
-            </a:r>
-            <a:endParaRPr lang="en-US" dirty="0" smtClean="0"/>
-          </a:p>
-          <a:p>
-            <a:r>
-              <a:rPr lang="en-US" dirty="0" smtClean="0"/>
-              <a:t>What I learned</a:t>
-            </a:r>
-          </a:p>
-          <a:p>
-            <a:pPr lvl="1"/>
-            <a:r>
-              <a:rPr lang="en-US" dirty="0" smtClean="0"/>
-              <a:t>Improved documentation</a:t>
-            </a:r>
-          </a:p>
-          <a:p>
-            <a:pPr lvl="1"/>
-            <a:r>
-              <a:rPr lang="en-US" dirty="0" smtClean="0"/>
-              <a:t>Time management skills</a:t>
-            </a:r>
-            <a:endParaRPr lang="en-US" dirty="0" smtClean="0"/>
           </a:p>
         </p:txBody>
       </p:sp>
     </p:spTree>
     <p:extLst>
       <p:ext uri="{BB962C8B-B14F-4D97-AF65-F5344CB8AC3E}">
-        <p14:creationId xmlns:p14="http://schemas.microsoft.com/office/powerpoint/2010/main" val="2827139130"/>
+        <p14:creationId xmlns="" xmlns:p14="http://schemas.microsoft.com/office/powerpoint/2010/main" val="501749378"/>
       </p:ext>
     </p:extLst>
   </p:cSld>
@@ -7811,163 +7524,7 @@
 </p:sld>
 </file>
 
-<file path=ppt/slides/slide23.xml><?xml version="1.0" encoding="utf-8"?>
-<p:sld xmlns:a="http://schemas.openxmlformats.org/drawingml/2006/main" xmlns:r="http://schemas.openxmlformats.org/officeDocument/2006/relationships" xmlns:p="http://schemas.openxmlformats.org/presentationml/2006/main">
-  <p:cSld>
-    <p:spTree>
-      <p:nvGrpSpPr>
-        <p:cNvPr id="1" name=""/>
-        <p:cNvGrpSpPr/>
-        <p:nvPr/>
-      </p:nvGrpSpPr>
-      <p:grpSpPr>
-        <a:xfrm>
-          <a:off x="0" y="0"/>
-          <a:ext cx="0" cy="0"/>
-          <a:chOff x="0" y="0"/>
-          <a:chExt cx="0" cy="0"/>
-        </a:xfrm>
-      </p:grpSpPr>
-      <p:sp>
-        <p:nvSpPr>
-          <p:cNvPr id="2" name="Title 1"/>
-          <p:cNvSpPr>
-            <a:spLocks noGrp="1"/>
-          </p:cNvSpPr>
-          <p:nvPr>
-            <p:ph type="title"/>
-          </p:nvPr>
-        </p:nvSpPr>
-        <p:spPr/>
-        <p:txBody>
-          <a:bodyPr/>
-          <a:lstStyle/>
-          <a:p>
-            <a:r>
-              <a:rPr lang="en-US" dirty="0" smtClean="0"/>
-              <a:t>Conclusion</a:t>
-            </a:r>
-            <a:endParaRPr lang="en-US" dirty="0"/>
-          </a:p>
-        </p:txBody>
-      </p:sp>
-      <p:sp>
-        <p:nvSpPr>
-          <p:cNvPr id="6" name="Content Placeholder 5"/>
-          <p:cNvSpPr>
-            <a:spLocks noGrp="1"/>
-          </p:cNvSpPr>
-          <p:nvPr>
-            <p:ph sz="half" idx="1"/>
-          </p:nvPr>
-        </p:nvSpPr>
-        <p:spPr>
-          <a:xfrm>
-            <a:off x="457200" y="1600200"/>
-            <a:ext cx="8153400" cy="4525963"/>
-          </a:xfrm>
-        </p:spPr>
-        <p:txBody>
-          <a:bodyPr>
-            <a:normAutofit/>
-          </a:bodyPr>
-          <a:lstStyle/>
-          <a:p>
-            <a:r>
-              <a:rPr lang="en-US" sz="3600" dirty="0" smtClean="0"/>
-              <a:t>Project is overall success</a:t>
-            </a:r>
-          </a:p>
-          <a:p>
-            <a:pPr lvl="1"/>
-            <a:r>
-              <a:rPr lang="en-US" sz="3600" dirty="0" smtClean="0"/>
-              <a:t>Almost </a:t>
-            </a:r>
-            <a:r>
-              <a:rPr lang="en-US" sz="3600" dirty="0" smtClean="0"/>
-              <a:t>every goal </a:t>
-            </a:r>
-            <a:r>
-              <a:rPr lang="en-US" sz="3600" dirty="0" smtClean="0"/>
-              <a:t>achieved</a:t>
-            </a:r>
-          </a:p>
-          <a:p>
-            <a:pPr lvl="1"/>
-            <a:r>
-              <a:rPr lang="en-US" sz="3600" dirty="0" smtClean="0"/>
-              <a:t>Accurate results</a:t>
-            </a:r>
-          </a:p>
-          <a:p>
-            <a:pPr lvl="1"/>
-            <a:r>
-              <a:rPr lang="en-US" sz="3600" dirty="0" smtClean="0"/>
-              <a:t>Highly automated (Little user interaction)</a:t>
-            </a:r>
-          </a:p>
-          <a:p>
-            <a:pPr lvl="1"/>
-            <a:r>
-              <a:rPr lang="en-US" sz="3600" dirty="0" smtClean="0"/>
-              <a:t>Structured development process</a:t>
-            </a:r>
-            <a:endParaRPr lang="en-US" sz="3600" dirty="0"/>
-          </a:p>
-        </p:txBody>
-      </p:sp>
-      <p:sp>
-        <p:nvSpPr>
-          <p:cNvPr id="5" name="Content Placeholder 4"/>
-          <p:cNvSpPr>
-            <a:spLocks noGrp="1"/>
-          </p:cNvSpPr>
-          <p:nvPr>
-            <p:ph sz="half" idx="2"/>
-          </p:nvPr>
-        </p:nvSpPr>
-        <p:spPr/>
-        <p:txBody>
-          <a:bodyPr>
-            <a:normAutofit/>
-          </a:bodyPr>
-          <a:lstStyle/>
-          <a:p>
-            <a:endParaRPr lang="en-US" sz="3600" dirty="0" smtClean="0"/>
-          </a:p>
-          <a:p>
-            <a:endParaRPr lang="en-US" dirty="0" smtClean="0"/>
-          </a:p>
-          <a:p>
-            <a:endParaRPr lang="en-US" dirty="0" smtClean="0"/>
-          </a:p>
-          <a:p>
-            <a:endParaRPr lang="en-US" dirty="0"/>
-          </a:p>
-        </p:txBody>
-      </p:sp>
-    </p:spTree>
-    <p:extLst>
-      <p:ext uri="{BB962C8B-B14F-4D97-AF65-F5344CB8AC3E}">
-        <p14:creationId xmlns:p14="http://schemas.microsoft.com/office/powerpoint/2010/main" val="501749378"/>
-      </p:ext>
-    </p:extLst>
-  </p:cSld>
-  <p:clrMapOvr>
-    <a:masterClrMapping/>
-  </p:clrMapOvr>
-  <p:timing>
-    <p:tnLst>
-      <p:par>
-        <p:cTn id="1" dur="indefinite" restart="never" nodeType="tmRoot"/>
-      </p:par>
-    </p:tnLst>
-  </p:timing>
-</p:sld>
-</file>
-
-<file path=ppt/slides/slide24.xml><?xml version="1.0" encoding="utf-8"?>
+<file path=ppt/slides/slide22.xml><?xml version="1.0" encoding="utf-8"?>
 <p:sld xmlns:a="http://schemas.openxmlformats.org/drawingml/2006/main" xmlns:r="http://schemas.openxmlformats.org/officeDocument/2006/relationships" xmlns:p="http://schemas.openxmlformats.org/presentationml/2006/main">
   <p:cSld>
     <p:spTree>
@@ -8254,15 +7811,7 @@
           <a:p>
             <a:r>
               <a:rPr lang="en-US" dirty="0" smtClean="0"/>
-              <a:t>Ratchet </a:t>
-            </a:r>
-            <a:r>
-              <a:rPr lang="en-US" dirty="0" smtClean="0"/>
-              <a:t>surface gives just the right disturbance to control the </a:t>
-            </a:r>
-            <a:r>
-              <a:rPr lang="en-US" dirty="0" smtClean="0"/>
-              <a:t>movement</a:t>
+              <a:t>Ratchet surface gives just the right disturbance to control the movement</a:t>
             </a:r>
           </a:p>
           <a:p>
@@ -8844,8 +8393,8 @@
         </p:blipFill>
         <p:spPr>
           <a:xfrm>
-            <a:off x="61282" y="1647246"/>
-            <a:ext cx="9021435" cy="4143954"/>
+            <a:off x="0" y="1723446"/>
+            <a:ext cx="9144000" cy="5058354"/>
           </a:xfrm>
           <a:prstGeom prst="rect">
             <a:avLst/>
@@ -8919,7 +8468,7 @@
           <a:blip r:embed="rId2" cstate="print">
             <a:extLst>
               <a:ext uri="{28A0092B-C50C-407E-A947-70E740481C1C}">
-                <a14:useLocalDpi xmlns:a14="http://schemas.microsoft.com/office/drawing/2010/main" val="0"/>
+                <a14:useLocalDpi xmlns="" xmlns:a14="http://schemas.microsoft.com/office/drawing/2010/main" val="0"/>
               </a:ext>
             </a:extLst>
           </a:blip>
@@ -8929,14 +8478,125 @@
         </p:blipFill>
         <p:spPr>
           <a:xfrm>
-            <a:off x="1066800" y="1295400"/>
-            <a:ext cx="7266989" cy="5247120"/>
+            <a:off x="838200" y="1295400"/>
+            <a:ext cx="7495589" cy="5412180"/>
           </a:xfrm>
           <a:prstGeom prst="rect">
             <a:avLst/>
           </a:prstGeom>
         </p:spPr>
       </p:pic>
+      <p:cxnSp>
+        <p:nvCxnSpPr>
+          <p:cNvPr id="5" name="Straight Arrow Connector 4"/>
+          <p:cNvCxnSpPr/>
+          <p:nvPr/>
+        </p:nvCxnSpPr>
+        <p:spPr>
+          <a:xfrm rot="10800000" flipV="1">
+            <a:off x="2286000" y="4724400"/>
+            <a:ext cx="3962400" cy="1"/>
+          </a:xfrm>
+          <a:prstGeom prst="straightConnector1">
+            <a:avLst/>
+          </a:prstGeom>
+          <a:ln w="127000" cap="sq">
+            <a:solidFill>
+              <a:schemeClr val="tx1"/>
+            </a:solidFill>
+            <a:headEnd type="none"/>
+            <a:tailEnd type="diamond" w="lg" len="med"/>
+          </a:ln>
+        </p:spPr>
+        <p:style>
+          <a:lnRef idx="1">
+            <a:schemeClr val="accent1"/>
+          </a:lnRef>
+          <a:fillRef idx="0">
+            <a:schemeClr val="accent1"/>
+          </a:fillRef>
+          <a:effectRef idx="0">
+            <a:schemeClr val="accent1"/>
+          </a:effectRef>
+          <a:fontRef idx="minor">
+            <a:schemeClr val="tx1"/>
+          </a:fontRef>
+        </p:style>
+      </p:cxnSp>
+      <p:cxnSp>
+        <p:nvCxnSpPr>
+          <p:cNvPr id="9" name="Straight Arrow Connector 8"/>
+          <p:cNvCxnSpPr/>
+          <p:nvPr/>
+        </p:nvCxnSpPr>
+        <p:spPr>
+          <a:xfrm flipV="1">
+            <a:off x="1524000" y="2209800"/>
+            <a:ext cx="1752600" cy="1676400"/>
+          </a:xfrm>
+          <a:prstGeom prst="straightConnector1">
+            <a:avLst/>
+          </a:prstGeom>
+          <a:ln w="127000" cap="sq">
+            <a:solidFill>
+              <a:schemeClr val="tx1"/>
+            </a:solidFill>
+            <a:headEnd type="none"/>
+            <a:tailEnd type="diamond" w="lg" len="med"/>
+          </a:ln>
+        </p:spPr>
+        <p:style>
+          <a:lnRef idx="1">
+            <a:schemeClr val="accent1"/>
+          </a:lnRef>
+          <a:fillRef idx="0">
+            <a:schemeClr val="accent1"/>
+          </a:fillRef>
+          <a:effectRef idx="0">
+            <a:schemeClr val="accent1"/>
+          </a:effectRef>
+          <a:fontRef idx="minor">
+            <a:schemeClr val="tx1"/>
+          </a:fontRef>
+        </p:style>
+      </p:cxnSp>
+      <p:cxnSp>
+        <p:nvCxnSpPr>
+          <p:cNvPr id="12" name="Straight Arrow Connector 11"/>
+          <p:cNvCxnSpPr/>
+          <p:nvPr/>
+        </p:nvCxnSpPr>
+        <p:spPr>
+          <a:xfrm rot="10800000">
+            <a:off x="5334000" y="2209801"/>
+            <a:ext cx="1828800" cy="533400"/>
+          </a:xfrm>
+          <a:prstGeom prst="straightConnector1">
+            <a:avLst/>
+          </a:prstGeom>
+          <a:ln w="127000" cap="sq">
+            <a:solidFill>
+              <a:schemeClr val="tx1"/>
+            </a:solidFill>
+            <a:headEnd type="none"/>
+            <a:tailEnd type="diamond" w="lg" len="med"/>
+          </a:ln>
+        </p:spPr>
+        <p:style>
+          <a:lnRef idx="1">
+            <a:schemeClr val="accent1"/>
+          </a:lnRef>
+          <a:fillRef idx="0">
+            <a:schemeClr val="accent1"/>
+          </a:fillRef>
+          <a:effectRef idx="0">
+            <a:schemeClr val="accent1"/>
+          </a:effectRef>
+          <a:fontRef idx="minor">
+            <a:schemeClr val="tx1"/>
+          </a:fontRef>
+        </p:style>
+      </p:cxnSp>
     </p:spTree>
   </p:cSld>
   <p:clrMapOvr>

</xml_diff>